<commit_message>
updating wine quality ppt slides
</commit_message>
<xml_diff>
--- a/Wine Quality Analysis.pptx
+++ b/Wine Quality Analysis.pptx
@@ -5,7 +5,7 @@
     <p:sldMasterId id="2147483659" r:id="rId1"/>
   </p:sldMasterIdLst>
   <p:notesMasterIdLst>
-    <p:notesMasterId r:id="rId10"/>
+    <p:notesMasterId r:id="rId11"/>
   </p:notesMasterIdLst>
   <p:sldIdLst>
     <p:sldId id="256" r:id="rId2"/>
@@ -16,18 +16,10 @@
     <p:sldId id="260" r:id="rId7"/>
     <p:sldId id="261" r:id="rId8"/>
     <p:sldId id="263" r:id="rId9"/>
+    <p:sldId id="264" r:id="rId10"/>
   </p:sldIdLst>
   <p:sldSz cx="9144000" cy="5143500" type="screen16x9"/>
   <p:notesSz cx="6858000" cy="9144000"/>
-  <p:embeddedFontLst>
-    <p:embeddedFont>
-      <p:font typeface="Roboto" panose="02000000000000000000" pitchFamily="2" charset="0"/>
-      <p:regular r:id="rId11"/>
-      <p:bold r:id="rId12"/>
-      <p:italic r:id="rId13"/>
-      <p:boldItalic r:id="rId14"/>
-    </p:embeddedFont>
-  </p:embeddedFontLst>
   <p:defaultTextStyle>
     <a:defPPr marR="0" lvl="0" algn="l" rtl="0">
       <a:lnSpc>
@@ -746,8 +738,8 @@
         </p:nvSpPr>
         <p:spPr>
           <a:xfrm>
-            <a:off x="381300" y="685800"/>
-            <a:ext cx="6096075" cy="3429000"/>
+            <a:off x="381000" y="685800"/>
+            <a:ext cx="6096000" cy="3429000"/>
           </a:xfrm>
           <a:custGeom>
             <a:avLst/>
@@ -1058,7 +1050,7 @@
         </p:nvSpPr>
         <p:spPr>
           <a:xfrm>
-            <a:off x="381300" y="685800"/>
+            <a:off x="381000" y="685800"/>
             <a:ext cx="6096000" cy="3429000"/>
           </a:xfrm>
           <a:custGeom>
@@ -1266,7 +1258,7 @@
         </p:nvSpPr>
         <p:spPr>
           <a:xfrm>
-            <a:off x="381300" y="685800"/>
+            <a:off x="381000" y="685800"/>
             <a:ext cx="6096000" cy="3429000"/>
           </a:xfrm>
           <a:custGeom>
@@ -1472,7 +1464,7 @@
   <p:cSld>
     <p:spTree>
       <p:nvGrpSpPr>
-        <p:cNvPr id="1" name="Shape 97"/>
+        <p:cNvPr id="1" name="Shape 82"/>
         <p:cNvGrpSpPr/>
         <p:nvPr/>
       </p:nvGrpSpPr>
@@ -1486,7 +1478,7 @@
       </p:grpSpPr>
       <p:sp>
         <p:nvSpPr>
-          <p:cNvPr id="98" name="Google Shape;98;g10d1865704b_0_6:notes"/>
+          <p:cNvPr id="83" name="Google Shape;83;g10d1865704b_2_6:notes"/>
           <p:cNvSpPr>
             <a:spLocks noGrp="1" noRot="1" noChangeAspect="1"/>
           </p:cNvSpPr>
@@ -1496,7 +1488,7 @@
         </p:nvSpPr>
         <p:spPr>
           <a:xfrm>
-            <a:off x="381300" y="685800"/>
+            <a:off x="381000" y="685800"/>
             <a:ext cx="6096000" cy="3429000"/>
           </a:xfrm>
           <a:custGeom>
@@ -1527,7 +1519,7 @@
       </p:sp>
       <p:sp>
         <p:nvSpPr>
-          <p:cNvPr id="99" name="Google Shape;99;g10d1865704b_0_6:notes"/>
+          <p:cNvPr id="84" name="Google Shape;84;g10d1865704b_2_6:notes"/>
           <p:cNvSpPr txBox="1">
             <a:spLocks noGrp="1"/>
           </p:cNvSpPr>
@@ -1551,19 +1543,155 @@
           <a:lstStyle/>
           <a:p>
             <a:pPr marL="0" lvl="0" indent="0" algn="l" rtl="0">
-              <a:spcBef>
-                <a:spcPts val="0"/>
-              </a:spcBef>
-              <a:spcAft>
-                <a:spcPts val="0"/>
+              <a:lnSpc>
+                <a:spcPct val="115000"/>
+              </a:lnSpc>
+              <a:spcBef>
+                <a:spcPts val="0"/>
+              </a:spcBef>
+              <a:spcAft>
+                <a:spcPts val="1200"/>
               </a:spcAft>
               <a:buNone/>
             </a:pPr>
-            <a:endParaRPr/>
+            <a:r>
+              <a:rPr lang="en">
+                <a:solidFill>
+                  <a:srgbClr val="595959"/>
+                </a:solidFill>
+              </a:rPr>
+              <a:t>https://towardsdatascience.com/what-makes-a-wine-good-ea370601a8e4</a:t>
+            </a:r>
+            <a:endParaRPr sz="400"/>
           </a:p>
         </p:txBody>
       </p:sp>
     </p:spTree>
+    <p:extLst>
+      <p:ext uri="{BB962C8B-B14F-4D97-AF65-F5344CB8AC3E}">
+        <p14:creationId xmlns:p14="http://schemas.microsoft.com/office/powerpoint/2010/main" val="840686498"/>
+      </p:ext>
+    </p:extLst>
+  </p:cSld>
+  <p:clrMapOvr>
+    <a:masterClrMapping/>
+  </p:clrMapOvr>
+</p:notes>
+</file>
+
+<file path=ppt/notesSlides/notesSlide9.xml><?xml version="1.0" encoding="utf-8"?>
+<p:notes xmlns:a="http://schemas.openxmlformats.org/drawingml/2006/main" xmlns:r="http://schemas.openxmlformats.org/officeDocument/2006/relationships" xmlns:p="http://schemas.openxmlformats.org/presentationml/2006/main" showMasterSp="0" showMasterPhAnim="0">
+  <p:cSld>
+    <p:spTree>
+      <p:nvGrpSpPr>
+        <p:cNvPr id="1" name="Shape 82"/>
+        <p:cNvGrpSpPr/>
+        <p:nvPr/>
+      </p:nvGrpSpPr>
+      <p:grpSpPr>
+        <a:xfrm>
+          <a:off x="0" y="0"/>
+          <a:ext cx="0" cy="0"/>
+          <a:chOff x="0" y="0"/>
+          <a:chExt cx="0" cy="0"/>
+        </a:xfrm>
+      </p:grpSpPr>
+      <p:sp>
+        <p:nvSpPr>
+          <p:cNvPr id="83" name="Google Shape;83;g10d1865704b_2_6:notes"/>
+          <p:cNvSpPr>
+            <a:spLocks noGrp="1" noRot="1" noChangeAspect="1"/>
+          </p:cNvSpPr>
+          <p:nvPr>
+            <p:ph type="sldImg" idx="2"/>
+          </p:nvPr>
+        </p:nvSpPr>
+        <p:spPr>
+          <a:xfrm>
+            <a:off x="381000" y="685800"/>
+            <a:ext cx="6096000" cy="3429000"/>
+          </a:xfrm>
+          <a:custGeom>
+            <a:avLst/>
+            <a:gdLst/>
+            <a:ahLst/>
+            <a:cxnLst/>
+            <a:rect l="l" t="t" r="r" b="b"/>
+            <a:pathLst>
+              <a:path w="120000" h="120000" extrusionOk="0">
+                <a:moveTo>
+                  <a:pt x="0" y="0"/>
+                </a:moveTo>
+                <a:lnTo>
+                  <a:pt x="120000" y="0"/>
+                </a:lnTo>
+                <a:lnTo>
+                  <a:pt x="120000" y="120000"/>
+                </a:lnTo>
+                <a:lnTo>
+                  <a:pt x="0" y="120000"/>
+                </a:lnTo>
+                <a:close/>
+              </a:path>
+            </a:pathLst>
+          </a:custGeom>
+        </p:spPr>
+      </p:sp>
+      <p:sp>
+        <p:nvSpPr>
+          <p:cNvPr id="84" name="Google Shape;84;g10d1865704b_2_6:notes"/>
+          <p:cNvSpPr txBox="1">
+            <a:spLocks noGrp="1"/>
+          </p:cNvSpPr>
+          <p:nvPr>
+            <p:ph type="body" idx="1"/>
+          </p:nvPr>
+        </p:nvSpPr>
+        <p:spPr>
+          <a:xfrm>
+            <a:off x="685800" y="4343400"/>
+            <a:ext cx="5486400" cy="4114800"/>
+          </a:xfrm>
+          <a:prstGeom prst="rect">
+            <a:avLst/>
+          </a:prstGeom>
+        </p:spPr>
+        <p:txBody>
+          <a:bodyPr spcFirstLastPara="1" wrap="square" lIns="91425" tIns="91425" rIns="91425" bIns="91425" anchor="t" anchorCtr="0">
+            <a:noAutofit/>
+          </a:bodyPr>
+          <a:lstStyle/>
+          <a:p>
+            <a:pPr marL="0" lvl="0" indent="0" algn="l" rtl="0">
+              <a:lnSpc>
+                <a:spcPct val="115000"/>
+              </a:lnSpc>
+              <a:spcBef>
+                <a:spcPts val="0"/>
+              </a:spcBef>
+              <a:spcAft>
+                <a:spcPts val="1200"/>
+              </a:spcAft>
+              <a:buNone/>
+            </a:pPr>
+            <a:r>
+              <a:rPr lang="en">
+                <a:solidFill>
+                  <a:srgbClr val="595959"/>
+                </a:solidFill>
+              </a:rPr>
+              <a:t>https://towardsdatascience.com/what-makes-a-wine-good-ea370601a8e4</a:t>
+            </a:r>
+            <a:endParaRPr sz="400"/>
+          </a:p>
+        </p:txBody>
+      </p:sp>
+    </p:spTree>
+    <p:extLst>
+      <p:ext uri="{BB962C8B-B14F-4D97-AF65-F5344CB8AC3E}">
+        <p14:creationId xmlns:p14="http://schemas.microsoft.com/office/powerpoint/2010/main" val="202276296"/>
+      </p:ext>
+    </p:extLst>
   </p:cSld>
   <p:clrMapOvr>
     <a:masterClrMapping/>
@@ -1961,370 +2089,6 @@
 </file>
 
 <file path=ppt/slideLayouts/slideLayout10.xml><?xml version="1.0" encoding="utf-8"?>
-<p:sldLayout xmlns:a="http://schemas.openxmlformats.org/drawingml/2006/main" xmlns:r="http://schemas.openxmlformats.org/officeDocument/2006/relationships" xmlns:p="http://schemas.openxmlformats.org/presentationml/2006/main" matchingName="Big number">
-  <p:cSld name="BIG_NUMBER">
-    <p:spTree>
-      <p:nvGrpSpPr>
-        <p:cNvPr id="1" name="Shape 44"/>
-        <p:cNvGrpSpPr/>
-        <p:nvPr/>
-      </p:nvGrpSpPr>
-      <p:grpSpPr>
-        <a:xfrm>
-          <a:off x="0" y="0"/>
-          <a:ext cx="0" cy="0"/>
-          <a:chOff x="0" y="0"/>
-          <a:chExt cx="0" cy="0"/>
-        </a:xfrm>
-      </p:grpSpPr>
-      <p:sp>
-        <p:nvSpPr>
-          <p:cNvPr id="45" name="Google Shape;45;p11"/>
-          <p:cNvSpPr txBox="1">
-            <a:spLocks noGrp="1"/>
-          </p:cNvSpPr>
-          <p:nvPr>
-            <p:ph type="title" hasCustomPrompt="1"/>
-          </p:nvPr>
-        </p:nvSpPr>
-        <p:spPr>
-          <a:xfrm>
-            <a:off x="311700" y="1106125"/>
-            <a:ext cx="8520600" cy="1963500"/>
-          </a:xfrm>
-          <a:prstGeom prst="rect">
-            <a:avLst/>
-          </a:prstGeom>
-        </p:spPr>
-        <p:txBody>
-          <a:bodyPr spcFirstLastPara="1" wrap="square" lIns="91425" tIns="91425" rIns="91425" bIns="91425" anchor="b" anchorCtr="0">
-            <a:normAutofit/>
-          </a:bodyPr>
-          <a:lstStyle>
-            <a:lvl1pPr lvl="0" algn="ctr">
-              <a:spcBef>
-                <a:spcPts val="0"/>
-              </a:spcBef>
-              <a:spcAft>
-                <a:spcPts val="0"/>
-              </a:spcAft>
-              <a:buSzPts val="12000"/>
-              <a:buNone/>
-              <a:defRPr sz="12000"/>
-            </a:lvl1pPr>
-            <a:lvl2pPr lvl="1" algn="ctr">
-              <a:spcBef>
-                <a:spcPts val="0"/>
-              </a:spcBef>
-              <a:spcAft>
-                <a:spcPts val="0"/>
-              </a:spcAft>
-              <a:buSzPts val="12000"/>
-              <a:buNone/>
-              <a:defRPr sz="12000"/>
-            </a:lvl2pPr>
-            <a:lvl3pPr lvl="2" algn="ctr">
-              <a:spcBef>
-                <a:spcPts val="0"/>
-              </a:spcBef>
-              <a:spcAft>
-                <a:spcPts val="0"/>
-              </a:spcAft>
-              <a:buSzPts val="12000"/>
-              <a:buNone/>
-              <a:defRPr sz="12000"/>
-            </a:lvl3pPr>
-            <a:lvl4pPr lvl="3" algn="ctr">
-              <a:spcBef>
-                <a:spcPts val="0"/>
-              </a:spcBef>
-              <a:spcAft>
-                <a:spcPts val="0"/>
-              </a:spcAft>
-              <a:buSzPts val="12000"/>
-              <a:buNone/>
-              <a:defRPr sz="12000"/>
-            </a:lvl4pPr>
-            <a:lvl5pPr lvl="4" algn="ctr">
-              <a:spcBef>
-                <a:spcPts val="0"/>
-              </a:spcBef>
-              <a:spcAft>
-                <a:spcPts val="0"/>
-              </a:spcAft>
-              <a:buSzPts val="12000"/>
-              <a:buNone/>
-              <a:defRPr sz="12000"/>
-            </a:lvl5pPr>
-            <a:lvl6pPr lvl="5" algn="ctr">
-              <a:spcBef>
-                <a:spcPts val="0"/>
-              </a:spcBef>
-              <a:spcAft>
-                <a:spcPts val="0"/>
-              </a:spcAft>
-              <a:buSzPts val="12000"/>
-              <a:buNone/>
-              <a:defRPr sz="12000"/>
-            </a:lvl6pPr>
-            <a:lvl7pPr lvl="6" algn="ctr">
-              <a:spcBef>
-                <a:spcPts val="0"/>
-              </a:spcBef>
-              <a:spcAft>
-                <a:spcPts val="0"/>
-              </a:spcAft>
-              <a:buSzPts val="12000"/>
-              <a:buNone/>
-              <a:defRPr sz="12000"/>
-            </a:lvl7pPr>
-            <a:lvl8pPr lvl="7" algn="ctr">
-              <a:spcBef>
-                <a:spcPts val="0"/>
-              </a:spcBef>
-              <a:spcAft>
-                <a:spcPts val="0"/>
-              </a:spcAft>
-              <a:buSzPts val="12000"/>
-              <a:buNone/>
-              <a:defRPr sz="12000"/>
-            </a:lvl8pPr>
-            <a:lvl9pPr lvl="8" algn="ctr">
-              <a:spcBef>
-                <a:spcPts val="0"/>
-              </a:spcBef>
-              <a:spcAft>
-                <a:spcPts val="0"/>
-              </a:spcAft>
-              <a:buSzPts val="12000"/>
-              <a:buNone/>
-              <a:defRPr sz="12000"/>
-            </a:lvl9pPr>
-          </a:lstStyle>
-          <a:p>
-            <a:r>
-              <a:t>xx%</a:t>
-            </a:r>
-          </a:p>
-        </p:txBody>
-      </p:sp>
-      <p:sp>
-        <p:nvSpPr>
-          <p:cNvPr id="46" name="Google Shape;46;p11"/>
-          <p:cNvSpPr txBox="1">
-            <a:spLocks noGrp="1"/>
-          </p:cNvSpPr>
-          <p:nvPr>
-            <p:ph type="body" idx="1"/>
-          </p:nvPr>
-        </p:nvSpPr>
-        <p:spPr>
-          <a:xfrm>
-            <a:off x="311700" y="3152225"/>
-            <a:ext cx="8520600" cy="1300800"/>
-          </a:xfrm>
-          <a:prstGeom prst="rect">
-            <a:avLst/>
-          </a:prstGeom>
-        </p:spPr>
-        <p:txBody>
-          <a:bodyPr spcFirstLastPara="1" wrap="square" lIns="91425" tIns="91425" rIns="91425" bIns="91425" anchor="t" anchorCtr="0">
-            <a:normAutofit/>
-          </a:bodyPr>
-          <a:lstStyle>
-            <a:lvl1pPr marL="457200" lvl="0" indent="-342900" algn="ctr">
-              <a:spcBef>
-                <a:spcPts val="0"/>
-              </a:spcBef>
-              <a:spcAft>
-                <a:spcPts val="0"/>
-              </a:spcAft>
-              <a:buSzPts val="1800"/>
-              <a:buChar char="●"/>
-              <a:defRPr/>
-            </a:lvl1pPr>
-            <a:lvl2pPr marL="914400" lvl="1" indent="-317500" algn="ctr">
-              <a:spcBef>
-                <a:spcPts val="0"/>
-              </a:spcBef>
-              <a:spcAft>
-                <a:spcPts val="0"/>
-              </a:spcAft>
-              <a:buSzPts val="1400"/>
-              <a:buChar char="○"/>
-              <a:defRPr/>
-            </a:lvl2pPr>
-            <a:lvl3pPr marL="1371600" lvl="2" indent="-317500" algn="ctr">
-              <a:spcBef>
-                <a:spcPts val="0"/>
-              </a:spcBef>
-              <a:spcAft>
-                <a:spcPts val="0"/>
-              </a:spcAft>
-              <a:buSzPts val="1400"/>
-              <a:buChar char="■"/>
-              <a:defRPr/>
-            </a:lvl3pPr>
-            <a:lvl4pPr marL="1828800" lvl="3" indent="-317500" algn="ctr">
-              <a:spcBef>
-                <a:spcPts val="0"/>
-              </a:spcBef>
-              <a:spcAft>
-                <a:spcPts val="0"/>
-              </a:spcAft>
-              <a:buSzPts val="1400"/>
-              <a:buChar char="●"/>
-              <a:defRPr/>
-            </a:lvl4pPr>
-            <a:lvl5pPr marL="2286000" lvl="4" indent="-317500" algn="ctr">
-              <a:spcBef>
-                <a:spcPts val="0"/>
-              </a:spcBef>
-              <a:spcAft>
-                <a:spcPts val="0"/>
-              </a:spcAft>
-              <a:buSzPts val="1400"/>
-              <a:buChar char="○"/>
-              <a:defRPr/>
-            </a:lvl5pPr>
-            <a:lvl6pPr marL="2743200" lvl="5" indent="-317500" algn="ctr">
-              <a:spcBef>
-                <a:spcPts val="0"/>
-              </a:spcBef>
-              <a:spcAft>
-                <a:spcPts val="0"/>
-              </a:spcAft>
-              <a:buSzPts val="1400"/>
-              <a:buChar char="■"/>
-              <a:defRPr/>
-            </a:lvl6pPr>
-            <a:lvl7pPr marL="3200400" lvl="6" indent="-317500" algn="ctr">
-              <a:spcBef>
-                <a:spcPts val="0"/>
-              </a:spcBef>
-              <a:spcAft>
-                <a:spcPts val="0"/>
-              </a:spcAft>
-              <a:buSzPts val="1400"/>
-              <a:buChar char="●"/>
-              <a:defRPr/>
-            </a:lvl7pPr>
-            <a:lvl8pPr marL="3657600" lvl="7" indent="-317500" algn="ctr">
-              <a:spcBef>
-                <a:spcPts val="0"/>
-              </a:spcBef>
-              <a:spcAft>
-                <a:spcPts val="0"/>
-              </a:spcAft>
-              <a:buSzPts val="1400"/>
-              <a:buChar char="○"/>
-              <a:defRPr/>
-            </a:lvl8pPr>
-            <a:lvl9pPr marL="4114800" lvl="8" indent="-317500" algn="ctr">
-              <a:spcBef>
-                <a:spcPts val="0"/>
-              </a:spcBef>
-              <a:spcAft>
-                <a:spcPts val="0"/>
-              </a:spcAft>
-              <a:buSzPts val="1400"/>
-              <a:buChar char="■"/>
-              <a:defRPr/>
-            </a:lvl9pPr>
-          </a:lstStyle>
-          <a:p>
-            <a:endParaRPr/>
-          </a:p>
-        </p:txBody>
-      </p:sp>
-      <p:sp>
-        <p:nvSpPr>
-          <p:cNvPr id="47" name="Google Shape;47;p11"/>
-          <p:cNvSpPr txBox="1">
-            <a:spLocks noGrp="1"/>
-          </p:cNvSpPr>
-          <p:nvPr>
-            <p:ph type="sldNum" idx="12"/>
-          </p:nvPr>
-        </p:nvSpPr>
-        <p:spPr>
-          <a:xfrm>
-            <a:off x="8472458" y="4663217"/>
-            <a:ext cx="548700" cy="393600"/>
-          </a:xfrm>
-          <a:prstGeom prst="rect">
-            <a:avLst/>
-          </a:prstGeom>
-        </p:spPr>
-        <p:txBody>
-          <a:bodyPr spcFirstLastPara="1" wrap="square" lIns="91425" tIns="91425" rIns="91425" bIns="91425" anchor="ctr" anchorCtr="0">
-            <a:normAutofit/>
-          </a:bodyPr>
-          <a:lstStyle>
-            <a:lvl1pPr lvl="0">
-              <a:buNone/>
-              <a:defRPr/>
-            </a:lvl1pPr>
-            <a:lvl2pPr lvl="1">
-              <a:buNone/>
-              <a:defRPr/>
-            </a:lvl2pPr>
-            <a:lvl3pPr lvl="2">
-              <a:buNone/>
-              <a:defRPr/>
-            </a:lvl3pPr>
-            <a:lvl4pPr lvl="3">
-              <a:buNone/>
-              <a:defRPr/>
-            </a:lvl4pPr>
-            <a:lvl5pPr lvl="4">
-              <a:buNone/>
-              <a:defRPr/>
-            </a:lvl5pPr>
-            <a:lvl6pPr lvl="5">
-              <a:buNone/>
-              <a:defRPr/>
-            </a:lvl6pPr>
-            <a:lvl7pPr lvl="6">
-              <a:buNone/>
-              <a:defRPr/>
-            </a:lvl7pPr>
-            <a:lvl8pPr lvl="7">
-              <a:buNone/>
-              <a:defRPr/>
-            </a:lvl8pPr>
-            <a:lvl9pPr lvl="8">
-              <a:buNone/>
-              <a:defRPr/>
-            </a:lvl9pPr>
-          </a:lstStyle>
-          <a:p>
-            <a:pPr marL="0" lvl="0" indent="0" algn="r" rtl="0">
-              <a:spcBef>
-                <a:spcPts val="0"/>
-              </a:spcBef>
-              <a:spcAft>
-                <a:spcPts val="0"/>
-              </a:spcAft>
-              <a:buNone/>
-            </a:pPr>
-            <a:fld id="{00000000-1234-1234-1234-123412341234}" type="slidenum">
-              <a:rPr lang="en"/>
-              <a:t>‹#›</a:t>
-            </a:fld>
-            <a:endParaRPr/>
-          </a:p>
-        </p:txBody>
-      </p:sp>
-    </p:spTree>
-  </p:cSld>
-  <p:clrMapOvr>
-    <a:masterClrMapping/>
-  </p:clrMapOvr>
-</p:sldLayout>
-</file>
-
-<file path=ppt/slideLayouts/slideLayout11.xml><?xml version="1.0" encoding="utf-8"?>
 <p:sldLayout xmlns:a="http://schemas.openxmlformats.org/drawingml/2006/main" xmlns:r="http://schemas.openxmlformats.org/officeDocument/2006/relationships" xmlns:p="http://schemas.openxmlformats.org/presentationml/2006/main" matchingName="Blank" type="blank">
   <p:cSld name="BLANK">
     <p:spTree>
@@ -3024,497 +2788,6 @@
 </file>
 
 <file path=ppt/slideLayouts/slideLayout4.xml><?xml version="1.0" encoding="utf-8"?>
-<p:sldLayout xmlns:a="http://schemas.openxmlformats.org/drawingml/2006/main" xmlns:r="http://schemas.openxmlformats.org/officeDocument/2006/relationships" xmlns:p="http://schemas.openxmlformats.org/presentationml/2006/main" matchingName="Title and two columns" type="twoColTx">
-  <p:cSld name="TITLE_AND_TWO_COLUMNS">
-    <p:spTree>
-      <p:nvGrpSpPr>
-        <p:cNvPr id="1" name="Shape 20"/>
-        <p:cNvGrpSpPr/>
-        <p:nvPr/>
-      </p:nvGrpSpPr>
-      <p:grpSpPr>
-        <a:xfrm>
-          <a:off x="0" y="0"/>
-          <a:ext cx="0" cy="0"/>
-          <a:chOff x="0" y="0"/>
-          <a:chExt cx="0" cy="0"/>
-        </a:xfrm>
-      </p:grpSpPr>
-      <p:sp>
-        <p:nvSpPr>
-          <p:cNvPr id="21" name="Google Shape;21;p5"/>
-          <p:cNvSpPr txBox="1">
-            <a:spLocks noGrp="1"/>
-          </p:cNvSpPr>
-          <p:nvPr>
-            <p:ph type="title"/>
-          </p:nvPr>
-        </p:nvSpPr>
-        <p:spPr>
-          <a:xfrm>
-            <a:off x="311700" y="445025"/>
-            <a:ext cx="8520600" cy="572700"/>
-          </a:xfrm>
-          <a:prstGeom prst="rect">
-            <a:avLst/>
-          </a:prstGeom>
-        </p:spPr>
-        <p:txBody>
-          <a:bodyPr spcFirstLastPara="1" wrap="square" lIns="91425" tIns="91425" rIns="91425" bIns="91425" anchor="t" anchorCtr="0">
-            <a:normAutofit/>
-          </a:bodyPr>
-          <a:lstStyle>
-            <a:lvl1pPr lvl="0">
-              <a:spcBef>
-                <a:spcPts val="0"/>
-              </a:spcBef>
-              <a:spcAft>
-                <a:spcPts val="0"/>
-              </a:spcAft>
-              <a:buSzPts val="2800"/>
-              <a:buNone/>
-              <a:defRPr/>
-            </a:lvl1pPr>
-            <a:lvl2pPr lvl="1">
-              <a:spcBef>
-                <a:spcPts val="0"/>
-              </a:spcBef>
-              <a:spcAft>
-                <a:spcPts val="0"/>
-              </a:spcAft>
-              <a:buSzPts val="2800"/>
-              <a:buNone/>
-              <a:defRPr/>
-            </a:lvl2pPr>
-            <a:lvl3pPr lvl="2">
-              <a:spcBef>
-                <a:spcPts val="0"/>
-              </a:spcBef>
-              <a:spcAft>
-                <a:spcPts val="0"/>
-              </a:spcAft>
-              <a:buSzPts val="2800"/>
-              <a:buNone/>
-              <a:defRPr/>
-            </a:lvl3pPr>
-            <a:lvl4pPr lvl="3">
-              <a:spcBef>
-                <a:spcPts val="0"/>
-              </a:spcBef>
-              <a:spcAft>
-                <a:spcPts val="0"/>
-              </a:spcAft>
-              <a:buSzPts val="2800"/>
-              <a:buNone/>
-              <a:defRPr/>
-            </a:lvl4pPr>
-            <a:lvl5pPr lvl="4">
-              <a:spcBef>
-                <a:spcPts val="0"/>
-              </a:spcBef>
-              <a:spcAft>
-                <a:spcPts val="0"/>
-              </a:spcAft>
-              <a:buSzPts val="2800"/>
-              <a:buNone/>
-              <a:defRPr/>
-            </a:lvl5pPr>
-            <a:lvl6pPr lvl="5">
-              <a:spcBef>
-                <a:spcPts val="0"/>
-              </a:spcBef>
-              <a:spcAft>
-                <a:spcPts val="0"/>
-              </a:spcAft>
-              <a:buSzPts val="2800"/>
-              <a:buNone/>
-              <a:defRPr/>
-            </a:lvl6pPr>
-            <a:lvl7pPr lvl="6">
-              <a:spcBef>
-                <a:spcPts val="0"/>
-              </a:spcBef>
-              <a:spcAft>
-                <a:spcPts val="0"/>
-              </a:spcAft>
-              <a:buSzPts val="2800"/>
-              <a:buNone/>
-              <a:defRPr/>
-            </a:lvl7pPr>
-            <a:lvl8pPr lvl="7">
-              <a:spcBef>
-                <a:spcPts val="0"/>
-              </a:spcBef>
-              <a:spcAft>
-                <a:spcPts val="0"/>
-              </a:spcAft>
-              <a:buSzPts val="2800"/>
-              <a:buNone/>
-              <a:defRPr/>
-            </a:lvl8pPr>
-            <a:lvl9pPr lvl="8">
-              <a:spcBef>
-                <a:spcPts val="0"/>
-              </a:spcBef>
-              <a:spcAft>
-                <a:spcPts val="0"/>
-              </a:spcAft>
-              <a:buSzPts val="2800"/>
-              <a:buNone/>
-              <a:defRPr/>
-            </a:lvl9pPr>
-          </a:lstStyle>
-          <a:p>
-            <a:endParaRPr/>
-          </a:p>
-        </p:txBody>
-      </p:sp>
-      <p:sp>
-        <p:nvSpPr>
-          <p:cNvPr id="22" name="Google Shape;22;p5"/>
-          <p:cNvSpPr txBox="1">
-            <a:spLocks noGrp="1"/>
-          </p:cNvSpPr>
-          <p:nvPr>
-            <p:ph type="body" idx="1"/>
-          </p:nvPr>
-        </p:nvSpPr>
-        <p:spPr>
-          <a:xfrm>
-            <a:off x="311700" y="1152475"/>
-            <a:ext cx="3999900" cy="3416400"/>
-          </a:xfrm>
-          <a:prstGeom prst="rect">
-            <a:avLst/>
-          </a:prstGeom>
-        </p:spPr>
-        <p:txBody>
-          <a:bodyPr spcFirstLastPara="1" wrap="square" lIns="91425" tIns="91425" rIns="91425" bIns="91425" anchor="t" anchorCtr="0">
-            <a:normAutofit/>
-          </a:bodyPr>
-          <a:lstStyle>
-            <a:lvl1pPr marL="457200" lvl="0" indent="-317500">
-              <a:spcBef>
-                <a:spcPts val="0"/>
-              </a:spcBef>
-              <a:spcAft>
-                <a:spcPts val="0"/>
-              </a:spcAft>
-              <a:buSzPts val="1400"/>
-              <a:buChar char="●"/>
-              <a:defRPr sz="1400"/>
-            </a:lvl1pPr>
-            <a:lvl2pPr marL="914400" lvl="1" indent="-304800">
-              <a:spcBef>
-                <a:spcPts val="0"/>
-              </a:spcBef>
-              <a:spcAft>
-                <a:spcPts val="0"/>
-              </a:spcAft>
-              <a:buSzPts val="1200"/>
-              <a:buChar char="○"/>
-              <a:defRPr sz="1200"/>
-            </a:lvl2pPr>
-            <a:lvl3pPr marL="1371600" lvl="2" indent="-304800">
-              <a:spcBef>
-                <a:spcPts val="0"/>
-              </a:spcBef>
-              <a:spcAft>
-                <a:spcPts val="0"/>
-              </a:spcAft>
-              <a:buSzPts val="1200"/>
-              <a:buChar char="■"/>
-              <a:defRPr sz="1200"/>
-            </a:lvl3pPr>
-            <a:lvl4pPr marL="1828800" lvl="3" indent="-304800">
-              <a:spcBef>
-                <a:spcPts val="0"/>
-              </a:spcBef>
-              <a:spcAft>
-                <a:spcPts val="0"/>
-              </a:spcAft>
-              <a:buSzPts val="1200"/>
-              <a:buChar char="●"/>
-              <a:defRPr sz="1200"/>
-            </a:lvl4pPr>
-            <a:lvl5pPr marL="2286000" lvl="4" indent="-304800">
-              <a:spcBef>
-                <a:spcPts val="0"/>
-              </a:spcBef>
-              <a:spcAft>
-                <a:spcPts val="0"/>
-              </a:spcAft>
-              <a:buSzPts val="1200"/>
-              <a:buChar char="○"/>
-              <a:defRPr sz="1200"/>
-            </a:lvl5pPr>
-            <a:lvl6pPr marL="2743200" lvl="5" indent="-304800">
-              <a:spcBef>
-                <a:spcPts val="0"/>
-              </a:spcBef>
-              <a:spcAft>
-                <a:spcPts val="0"/>
-              </a:spcAft>
-              <a:buSzPts val="1200"/>
-              <a:buChar char="■"/>
-              <a:defRPr sz="1200"/>
-            </a:lvl6pPr>
-            <a:lvl7pPr marL="3200400" lvl="6" indent="-304800">
-              <a:spcBef>
-                <a:spcPts val="0"/>
-              </a:spcBef>
-              <a:spcAft>
-                <a:spcPts val="0"/>
-              </a:spcAft>
-              <a:buSzPts val="1200"/>
-              <a:buChar char="●"/>
-              <a:defRPr sz="1200"/>
-            </a:lvl7pPr>
-            <a:lvl8pPr marL="3657600" lvl="7" indent="-304800">
-              <a:spcBef>
-                <a:spcPts val="0"/>
-              </a:spcBef>
-              <a:spcAft>
-                <a:spcPts val="0"/>
-              </a:spcAft>
-              <a:buSzPts val="1200"/>
-              <a:buChar char="○"/>
-              <a:defRPr sz="1200"/>
-            </a:lvl8pPr>
-            <a:lvl9pPr marL="4114800" lvl="8" indent="-304800">
-              <a:spcBef>
-                <a:spcPts val="0"/>
-              </a:spcBef>
-              <a:spcAft>
-                <a:spcPts val="0"/>
-              </a:spcAft>
-              <a:buSzPts val="1200"/>
-              <a:buChar char="■"/>
-              <a:defRPr sz="1200"/>
-            </a:lvl9pPr>
-          </a:lstStyle>
-          <a:p>
-            <a:endParaRPr/>
-          </a:p>
-        </p:txBody>
-      </p:sp>
-      <p:sp>
-        <p:nvSpPr>
-          <p:cNvPr id="23" name="Google Shape;23;p5"/>
-          <p:cNvSpPr txBox="1">
-            <a:spLocks noGrp="1"/>
-          </p:cNvSpPr>
-          <p:nvPr>
-            <p:ph type="body" idx="2"/>
-          </p:nvPr>
-        </p:nvSpPr>
-        <p:spPr>
-          <a:xfrm>
-            <a:off x="4832400" y="1152475"/>
-            <a:ext cx="3999900" cy="3416400"/>
-          </a:xfrm>
-          <a:prstGeom prst="rect">
-            <a:avLst/>
-          </a:prstGeom>
-        </p:spPr>
-        <p:txBody>
-          <a:bodyPr spcFirstLastPara="1" wrap="square" lIns="91425" tIns="91425" rIns="91425" bIns="91425" anchor="t" anchorCtr="0">
-            <a:normAutofit/>
-          </a:bodyPr>
-          <a:lstStyle>
-            <a:lvl1pPr marL="457200" lvl="0" indent="-317500">
-              <a:spcBef>
-                <a:spcPts val="0"/>
-              </a:spcBef>
-              <a:spcAft>
-                <a:spcPts val="0"/>
-              </a:spcAft>
-              <a:buSzPts val="1400"/>
-              <a:buChar char="●"/>
-              <a:defRPr sz="1400"/>
-            </a:lvl1pPr>
-            <a:lvl2pPr marL="914400" lvl="1" indent="-304800">
-              <a:spcBef>
-                <a:spcPts val="0"/>
-              </a:spcBef>
-              <a:spcAft>
-                <a:spcPts val="0"/>
-              </a:spcAft>
-              <a:buSzPts val="1200"/>
-              <a:buChar char="○"/>
-              <a:defRPr sz="1200"/>
-            </a:lvl2pPr>
-            <a:lvl3pPr marL="1371600" lvl="2" indent="-304800">
-              <a:spcBef>
-                <a:spcPts val="0"/>
-              </a:spcBef>
-              <a:spcAft>
-                <a:spcPts val="0"/>
-              </a:spcAft>
-              <a:buSzPts val="1200"/>
-              <a:buChar char="■"/>
-              <a:defRPr sz="1200"/>
-            </a:lvl3pPr>
-            <a:lvl4pPr marL="1828800" lvl="3" indent="-304800">
-              <a:spcBef>
-                <a:spcPts val="0"/>
-              </a:spcBef>
-              <a:spcAft>
-                <a:spcPts val="0"/>
-              </a:spcAft>
-              <a:buSzPts val="1200"/>
-              <a:buChar char="●"/>
-              <a:defRPr sz="1200"/>
-            </a:lvl4pPr>
-            <a:lvl5pPr marL="2286000" lvl="4" indent="-304800">
-              <a:spcBef>
-                <a:spcPts val="0"/>
-              </a:spcBef>
-              <a:spcAft>
-                <a:spcPts val="0"/>
-              </a:spcAft>
-              <a:buSzPts val="1200"/>
-              <a:buChar char="○"/>
-              <a:defRPr sz="1200"/>
-            </a:lvl5pPr>
-            <a:lvl6pPr marL="2743200" lvl="5" indent="-304800">
-              <a:spcBef>
-                <a:spcPts val="0"/>
-              </a:spcBef>
-              <a:spcAft>
-                <a:spcPts val="0"/>
-              </a:spcAft>
-              <a:buSzPts val="1200"/>
-              <a:buChar char="■"/>
-              <a:defRPr sz="1200"/>
-            </a:lvl6pPr>
-            <a:lvl7pPr marL="3200400" lvl="6" indent="-304800">
-              <a:spcBef>
-                <a:spcPts val="0"/>
-              </a:spcBef>
-              <a:spcAft>
-                <a:spcPts val="0"/>
-              </a:spcAft>
-              <a:buSzPts val="1200"/>
-              <a:buChar char="●"/>
-              <a:defRPr sz="1200"/>
-            </a:lvl7pPr>
-            <a:lvl8pPr marL="3657600" lvl="7" indent="-304800">
-              <a:spcBef>
-                <a:spcPts val="0"/>
-              </a:spcBef>
-              <a:spcAft>
-                <a:spcPts val="0"/>
-              </a:spcAft>
-              <a:buSzPts val="1200"/>
-              <a:buChar char="○"/>
-              <a:defRPr sz="1200"/>
-            </a:lvl8pPr>
-            <a:lvl9pPr marL="4114800" lvl="8" indent="-304800">
-              <a:spcBef>
-                <a:spcPts val="0"/>
-              </a:spcBef>
-              <a:spcAft>
-                <a:spcPts val="0"/>
-              </a:spcAft>
-              <a:buSzPts val="1200"/>
-              <a:buChar char="■"/>
-              <a:defRPr sz="1200"/>
-            </a:lvl9pPr>
-          </a:lstStyle>
-          <a:p>
-            <a:endParaRPr/>
-          </a:p>
-        </p:txBody>
-      </p:sp>
-      <p:sp>
-        <p:nvSpPr>
-          <p:cNvPr id="24" name="Google Shape;24;p5"/>
-          <p:cNvSpPr txBox="1">
-            <a:spLocks noGrp="1"/>
-          </p:cNvSpPr>
-          <p:nvPr>
-            <p:ph type="sldNum" idx="12"/>
-          </p:nvPr>
-        </p:nvSpPr>
-        <p:spPr>
-          <a:xfrm>
-            <a:off x="8472458" y="4663217"/>
-            <a:ext cx="548700" cy="393600"/>
-          </a:xfrm>
-          <a:prstGeom prst="rect">
-            <a:avLst/>
-          </a:prstGeom>
-        </p:spPr>
-        <p:txBody>
-          <a:bodyPr spcFirstLastPara="1" wrap="square" lIns="91425" tIns="91425" rIns="91425" bIns="91425" anchor="ctr" anchorCtr="0">
-            <a:normAutofit/>
-          </a:bodyPr>
-          <a:lstStyle>
-            <a:lvl1pPr lvl="0">
-              <a:buNone/>
-              <a:defRPr/>
-            </a:lvl1pPr>
-            <a:lvl2pPr lvl="1">
-              <a:buNone/>
-              <a:defRPr/>
-            </a:lvl2pPr>
-            <a:lvl3pPr lvl="2">
-              <a:buNone/>
-              <a:defRPr/>
-            </a:lvl3pPr>
-            <a:lvl4pPr lvl="3">
-              <a:buNone/>
-              <a:defRPr/>
-            </a:lvl4pPr>
-            <a:lvl5pPr lvl="4">
-              <a:buNone/>
-              <a:defRPr/>
-            </a:lvl5pPr>
-            <a:lvl6pPr lvl="5">
-              <a:buNone/>
-              <a:defRPr/>
-            </a:lvl6pPr>
-            <a:lvl7pPr lvl="6">
-              <a:buNone/>
-              <a:defRPr/>
-            </a:lvl7pPr>
-            <a:lvl8pPr lvl="7">
-              <a:buNone/>
-              <a:defRPr/>
-            </a:lvl8pPr>
-            <a:lvl9pPr lvl="8">
-              <a:buNone/>
-              <a:defRPr/>
-            </a:lvl9pPr>
-          </a:lstStyle>
-          <a:p>
-            <a:pPr marL="0" lvl="0" indent="0" algn="r" rtl="0">
-              <a:spcBef>
-                <a:spcPts val="0"/>
-              </a:spcBef>
-              <a:spcAft>
-                <a:spcPts val="0"/>
-              </a:spcAft>
-              <a:buNone/>
-            </a:pPr>
-            <a:fld id="{00000000-1234-1234-1234-123412341234}" type="slidenum">
-              <a:rPr lang="en"/>
-              <a:t>‹#›</a:t>
-            </a:fld>
-            <a:endParaRPr/>
-          </a:p>
-        </p:txBody>
-      </p:sp>
-    </p:spTree>
-  </p:cSld>
-  <p:clrMapOvr>
-    <a:masterClrMapping/>
-  </p:clrMapOvr>
-</p:sldLayout>
-</file>
-
-<file path=ppt/slideLayouts/slideLayout5.xml><?xml version="1.0" encoding="utf-8"?>
 <p:sldLayout xmlns:a="http://schemas.openxmlformats.org/drawingml/2006/main" xmlns:r="http://schemas.openxmlformats.org/officeDocument/2006/relationships" xmlns:p="http://schemas.openxmlformats.org/presentationml/2006/main" matchingName="Title only" type="titleOnly">
   <p:cSld name="TITLE_ONLY">
     <p:spTree>
@@ -3747,7 +3020,7 @@
 </p:sldLayout>
 </file>
 
-<file path=ppt/slideLayouts/slideLayout6.xml><?xml version="1.0" encoding="utf-8"?>
+<file path=ppt/slideLayouts/slideLayout5.xml><?xml version="1.0" encoding="utf-8"?>
 <p:sldLayout xmlns:a="http://schemas.openxmlformats.org/drawingml/2006/main" xmlns:r="http://schemas.openxmlformats.org/officeDocument/2006/relationships" xmlns:p="http://schemas.openxmlformats.org/presentationml/2006/main" matchingName="One column text">
   <p:cSld name="ONE_COLUMN_TEXT">
     <p:spTree>
@@ -4109,7 +3382,7 @@
 </p:sldLayout>
 </file>
 
-<file path=ppt/slideLayouts/slideLayout7.xml><?xml version="1.0" encoding="utf-8"?>
+<file path=ppt/slideLayouts/slideLayout6.xml><?xml version="1.0" encoding="utf-8"?>
 <p:sldLayout xmlns:a="http://schemas.openxmlformats.org/drawingml/2006/main" xmlns:r="http://schemas.openxmlformats.org/officeDocument/2006/relationships" xmlns:p="http://schemas.openxmlformats.org/presentationml/2006/main" matchingName="Main point">
   <p:cSld name="MAIN_POINT">
     <p:spTree>
@@ -4342,7 +3615,7 @@
 </p:sldLayout>
 </file>
 
-<file path=ppt/slideLayouts/slideLayout8.xml><?xml version="1.0" encoding="utf-8"?>
+<file path=ppt/slideLayouts/slideLayout7.xml><?xml version="1.0" encoding="utf-8"?>
 <p:sldLayout xmlns:a="http://schemas.openxmlformats.org/drawingml/2006/main" xmlns:r="http://schemas.openxmlformats.org/officeDocument/2006/relationships" xmlns:p="http://schemas.openxmlformats.org/presentationml/2006/main" matchingName="Section title and description">
   <p:cSld name="SECTION_TITLE_AND_DESCRIPTION">
     <p:spTree>
@@ -4900,7 +4173,7 @@
 </p:sldLayout>
 </file>
 
-<file path=ppt/slideLayouts/slideLayout9.xml><?xml version="1.0" encoding="utf-8"?>
+<file path=ppt/slideLayouts/slideLayout8.xml><?xml version="1.0" encoding="utf-8"?>
 <p:sldLayout xmlns:a="http://schemas.openxmlformats.org/drawingml/2006/main" xmlns:r="http://schemas.openxmlformats.org/officeDocument/2006/relationships" xmlns:p="http://schemas.openxmlformats.org/presentationml/2006/main" matchingName="Caption">
   <p:cSld name="CAPTION_ONLY">
     <p:spTree>
@@ -4964,6 +4237,370 @@
       <p:sp>
         <p:nvSpPr>
           <p:cNvPr id="43" name="Google Shape;43;p10"/>
+          <p:cNvSpPr txBox="1">
+            <a:spLocks noGrp="1"/>
+          </p:cNvSpPr>
+          <p:nvPr>
+            <p:ph type="sldNum" idx="12"/>
+          </p:nvPr>
+        </p:nvSpPr>
+        <p:spPr>
+          <a:xfrm>
+            <a:off x="8472458" y="4663217"/>
+            <a:ext cx="548700" cy="393600"/>
+          </a:xfrm>
+          <a:prstGeom prst="rect">
+            <a:avLst/>
+          </a:prstGeom>
+        </p:spPr>
+        <p:txBody>
+          <a:bodyPr spcFirstLastPara="1" wrap="square" lIns="91425" tIns="91425" rIns="91425" bIns="91425" anchor="ctr" anchorCtr="0">
+            <a:normAutofit/>
+          </a:bodyPr>
+          <a:lstStyle>
+            <a:lvl1pPr lvl="0">
+              <a:buNone/>
+              <a:defRPr/>
+            </a:lvl1pPr>
+            <a:lvl2pPr lvl="1">
+              <a:buNone/>
+              <a:defRPr/>
+            </a:lvl2pPr>
+            <a:lvl3pPr lvl="2">
+              <a:buNone/>
+              <a:defRPr/>
+            </a:lvl3pPr>
+            <a:lvl4pPr lvl="3">
+              <a:buNone/>
+              <a:defRPr/>
+            </a:lvl4pPr>
+            <a:lvl5pPr lvl="4">
+              <a:buNone/>
+              <a:defRPr/>
+            </a:lvl5pPr>
+            <a:lvl6pPr lvl="5">
+              <a:buNone/>
+              <a:defRPr/>
+            </a:lvl6pPr>
+            <a:lvl7pPr lvl="6">
+              <a:buNone/>
+              <a:defRPr/>
+            </a:lvl7pPr>
+            <a:lvl8pPr lvl="7">
+              <a:buNone/>
+              <a:defRPr/>
+            </a:lvl8pPr>
+            <a:lvl9pPr lvl="8">
+              <a:buNone/>
+              <a:defRPr/>
+            </a:lvl9pPr>
+          </a:lstStyle>
+          <a:p>
+            <a:pPr marL="0" lvl="0" indent="0" algn="r" rtl="0">
+              <a:spcBef>
+                <a:spcPts val="0"/>
+              </a:spcBef>
+              <a:spcAft>
+                <a:spcPts val="0"/>
+              </a:spcAft>
+              <a:buNone/>
+            </a:pPr>
+            <a:fld id="{00000000-1234-1234-1234-123412341234}" type="slidenum">
+              <a:rPr lang="en"/>
+              <a:t>‹#›</a:t>
+            </a:fld>
+            <a:endParaRPr/>
+          </a:p>
+        </p:txBody>
+      </p:sp>
+    </p:spTree>
+  </p:cSld>
+  <p:clrMapOvr>
+    <a:masterClrMapping/>
+  </p:clrMapOvr>
+</p:sldLayout>
+</file>
+
+<file path=ppt/slideLayouts/slideLayout9.xml><?xml version="1.0" encoding="utf-8"?>
+<p:sldLayout xmlns:a="http://schemas.openxmlformats.org/drawingml/2006/main" xmlns:r="http://schemas.openxmlformats.org/officeDocument/2006/relationships" xmlns:p="http://schemas.openxmlformats.org/presentationml/2006/main" matchingName="Big number">
+  <p:cSld name="BIG_NUMBER">
+    <p:spTree>
+      <p:nvGrpSpPr>
+        <p:cNvPr id="1" name="Shape 44"/>
+        <p:cNvGrpSpPr/>
+        <p:nvPr/>
+      </p:nvGrpSpPr>
+      <p:grpSpPr>
+        <a:xfrm>
+          <a:off x="0" y="0"/>
+          <a:ext cx="0" cy="0"/>
+          <a:chOff x="0" y="0"/>
+          <a:chExt cx="0" cy="0"/>
+        </a:xfrm>
+      </p:grpSpPr>
+      <p:sp>
+        <p:nvSpPr>
+          <p:cNvPr id="45" name="Google Shape;45;p11"/>
+          <p:cNvSpPr txBox="1">
+            <a:spLocks noGrp="1"/>
+          </p:cNvSpPr>
+          <p:nvPr>
+            <p:ph type="title" hasCustomPrompt="1"/>
+          </p:nvPr>
+        </p:nvSpPr>
+        <p:spPr>
+          <a:xfrm>
+            <a:off x="311700" y="1106125"/>
+            <a:ext cx="8520600" cy="1963500"/>
+          </a:xfrm>
+          <a:prstGeom prst="rect">
+            <a:avLst/>
+          </a:prstGeom>
+        </p:spPr>
+        <p:txBody>
+          <a:bodyPr spcFirstLastPara="1" wrap="square" lIns="91425" tIns="91425" rIns="91425" bIns="91425" anchor="b" anchorCtr="0">
+            <a:normAutofit/>
+          </a:bodyPr>
+          <a:lstStyle>
+            <a:lvl1pPr lvl="0" algn="ctr">
+              <a:spcBef>
+                <a:spcPts val="0"/>
+              </a:spcBef>
+              <a:spcAft>
+                <a:spcPts val="0"/>
+              </a:spcAft>
+              <a:buSzPts val="12000"/>
+              <a:buNone/>
+              <a:defRPr sz="12000"/>
+            </a:lvl1pPr>
+            <a:lvl2pPr lvl="1" algn="ctr">
+              <a:spcBef>
+                <a:spcPts val="0"/>
+              </a:spcBef>
+              <a:spcAft>
+                <a:spcPts val="0"/>
+              </a:spcAft>
+              <a:buSzPts val="12000"/>
+              <a:buNone/>
+              <a:defRPr sz="12000"/>
+            </a:lvl2pPr>
+            <a:lvl3pPr lvl="2" algn="ctr">
+              <a:spcBef>
+                <a:spcPts val="0"/>
+              </a:spcBef>
+              <a:spcAft>
+                <a:spcPts val="0"/>
+              </a:spcAft>
+              <a:buSzPts val="12000"/>
+              <a:buNone/>
+              <a:defRPr sz="12000"/>
+            </a:lvl3pPr>
+            <a:lvl4pPr lvl="3" algn="ctr">
+              <a:spcBef>
+                <a:spcPts val="0"/>
+              </a:spcBef>
+              <a:spcAft>
+                <a:spcPts val="0"/>
+              </a:spcAft>
+              <a:buSzPts val="12000"/>
+              <a:buNone/>
+              <a:defRPr sz="12000"/>
+            </a:lvl4pPr>
+            <a:lvl5pPr lvl="4" algn="ctr">
+              <a:spcBef>
+                <a:spcPts val="0"/>
+              </a:spcBef>
+              <a:spcAft>
+                <a:spcPts val="0"/>
+              </a:spcAft>
+              <a:buSzPts val="12000"/>
+              <a:buNone/>
+              <a:defRPr sz="12000"/>
+            </a:lvl5pPr>
+            <a:lvl6pPr lvl="5" algn="ctr">
+              <a:spcBef>
+                <a:spcPts val="0"/>
+              </a:spcBef>
+              <a:spcAft>
+                <a:spcPts val="0"/>
+              </a:spcAft>
+              <a:buSzPts val="12000"/>
+              <a:buNone/>
+              <a:defRPr sz="12000"/>
+            </a:lvl6pPr>
+            <a:lvl7pPr lvl="6" algn="ctr">
+              <a:spcBef>
+                <a:spcPts val="0"/>
+              </a:spcBef>
+              <a:spcAft>
+                <a:spcPts val="0"/>
+              </a:spcAft>
+              <a:buSzPts val="12000"/>
+              <a:buNone/>
+              <a:defRPr sz="12000"/>
+            </a:lvl7pPr>
+            <a:lvl8pPr lvl="7" algn="ctr">
+              <a:spcBef>
+                <a:spcPts val="0"/>
+              </a:spcBef>
+              <a:spcAft>
+                <a:spcPts val="0"/>
+              </a:spcAft>
+              <a:buSzPts val="12000"/>
+              <a:buNone/>
+              <a:defRPr sz="12000"/>
+            </a:lvl8pPr>
+            <a:lvl9pPr lvl="8" algn="ctr">
+              <a:spcBef>
+                <a:spcPts val="0"/>
+              </a:spcBef>
+              <a:spcAft>
+                <a:spcPts val="0"/>
+              </a:spcAft>
+              <a:buSzPts val="12000"/>
+              <a:buNone/>
+              <a:defRPr sz="12000"/>
+            </a:lvl9pPr>
+          </a:lstStyle>
+          <a:p>
+            <a:r>
+              <a:t>xx%</a:t>
+            </a:r>
+          </a:p>
+        </p:txBody>
+      </p:sp>
+      <p:sp>
+        <p:nvSpPr>
+          <p:cNvPr id="46" name="Google Shape;46;p11"/>
+          <p:cNvSpPr txBox="1">
+            <a:spLocks noGrp="1"/>
+          </p:cNvSpPr>
+          <p:nvPr>
+            <p:ph type="body" idx="1"/>
+          </p:nvPr>
+        </p:nvSpPr>
+        <p:spPr>
+          <a:xfrm>
+            <a:off x="311700" y="3152225"/>
+            <a:ext cx="8520600" cy="1300800"/>
+          </a:xfrm>
+          <a:prstGeom prst="rect">
+            <a:avLst/>
+          </a:prstGeom>
+        </p:spPr>
+        <p:txBody>
+          <a:bodyPr spcFirstLastPara="1" wrap="square" lIns="91425" tIns="91425" rIns="91425" bIns="91425" anchor="t" anchorCtr="0">
+            <a:normAutofit/>
+          </a:bodyPr>
+          <a:lstStyle>
+            <a:lvl1pPr marL="457200" lvl="0" indent="-342900" algn="ctr">
+              <a:spcBef>
+                <a:spcPts val="0"/>
+              </a:spcBef>
+              <a:spcAft>
+                <a:spcPts val="0"/>
+              </a:spcAft>
+              <a:buSzPts val="1800"/>
+              <a:buChar char="●"/>
+              <a:defRPr/>
+            </a:lvl1pPr>
+            <a:lvl2pPr marL="914400" lvl="1" indent="-317500" algn="ctr">
+              <a:spcBef>
+                <a:spcPts val="0"/>
+              </a:spcBef>
+              <a:spcAft>
+                <a:spcPts val="0"/>
+              </a:spcAft>
+              <a:buSzPts val="1400"/>
+              <a:buChar char="○"/>
+              <a:defRPr/>
+            </a:lvl2pPr>
+            <a:lvl3pPr marL="1371600" lvl="2" indent="-317500" algn="ctr">
+              <a:spcBef>
+                <a:spcPts val="0"/>
+              </a:spcBef>
+              <a:spcAft>
+                <a:spcPts val="0"/>
+              </a:spcAft>
+              <a:buSzPts val="1400"/>
+              <a:buChar char="■"/>
+              <a:defRPr/>
+            </a:lvl3pPr>
+            <a:lvl4pPr marL="1828800" lvl="3" indent="-317500" algn="ctr">
+              <a:spcBef>
+                <a:spcPts val="0"/>
+              </a:spcBef>
+              <a:spcAft>
+                <a:spcPts val="0"/>
+              </a:spcAft>
+              <a:buSzPts val="1400"/>
+              <a:buChar char="●"/>
+              <a:defRPr/>
+            </a:lvl4pPr>
+            <a:lvl5pPr marL="2286000" lvl="4" indent="-317500" algn="ctr">
+              <a:spcBef>
+                <a:spcPts val="0"/>
+              </a:spcBef>
+              <a:spcAft>
+                <a:spcPts val="0"/>
+              </a:spcAft>
+              <a:buSzPts val="1400"/>
+              <a:buChar char="○"/>
+              <a:defRPr/>
+            </a:lvl5pPr>
+            <a:lvl6pPr marL="2743200" lvl="5" indent="-317500" algn="ctr">
+              <a:spcBef>
+                <a:spcPts val="0"/>
+              </a:spcBef>
+              <a:spcAft>
+                <a:spcPts val="0"/>
+              </a:spcAft>
+              <a:buSzPts val="1400"/>
+              <a:buChar char="■"/>
+              <a:defRPr/>
+            </a:lvl6pPr>
+            <a:lvl7pPr marL="3200400" lvl="6" indent="-317500" algn="ctr">
+              <a:spcBef>
+                <a:spcPts val="0"/>
+              </a:spcBef>
+              <a:spcAft>
+                <a:spcPts val="0"/>
+              </a:spcAft>
+              <a:buSzPts val="1400"/>
+              <a:buChar char="●"/>
+              <a:defRPr/>
+            </a:lvl7pPr>
+            <a:lvl8pPr marL="3657600" lvl="7" indent="-317500" algn="ctr">
+              <a:spcBef>
+                <a:spcPts val="0"/>
+              </a:spcBef>
+              <a:spcAft>
+                <a:spcPts val="0"/>
+              </a:spcAft>
+              <a:buSzPts val="1400"/>
+              <a:buChar char="○"/>
+              <a:defRPr/>
+            </a:lvl8pPr>
+            <a:lvl9pPr marL="4114800" lvl="8" indent="-317500" algn="ctr">
+              <a:spcBef>
+                <a:spcPts val="0"/>
+              </a:spcBef>
+              <a:spcAft>
+                <a:spcPts val="0"/>
+              </a:spcAft>
+              <a:buSzPts val="1400"/>
+              <a:buChar char="■"/>
+              <a:defRPr/>
+            </a:lvl9pPr>
+          </a:lstStyle>
+          <a:p>
+            <a:endParaRPr/>
+          </a:p>
+        </p:txBody>
+      </p:sp>
+      <p:sp>
+        <p:nvSpPr>
+          <p:cNvPr id="47" name="Google Shape;47;p11"/>
           <p:cNvSpPr txBox="1">
             <a:spLocks noGrp="1"/>
           </p:cNvSpPr>
@@ -5618,14 +5255,13 @@
     <p:sldLayoutId id="2147483648" r:id="rId1"/>
     <p:sldLayoutId id="2147483649" r:id="rId2"/>
     <p:sldLayoutId id="2147483650" r:id="rId3"/>
-    <p:sldLayoutId id="2147483651" r:id="rId4"/>
-    <p:sldLayoutId id="2147483652" r:id="rId5"/>
-    <p:sldLayoutId id="2147483653" r:id="rId6"/>
-    <p:sldLayoutId id="2147483654" r:id="rId7"/>
-    <p:sldLayoutId id="2147483655" r:id="rId8"/>
-    <p:sldLayoutId id="2147483656" r:id="rId9"/>
-    <p:sldLayoutId id="2147483657" r:id="rId10"/>
-    <p:sldLayoutId id="2147483658" r:id="rId11"/>
+    <p:sldLayoutId id="2147483652" r:id="rId4"/>
+    <p:sldLayoutId id="2147483653" r:id="rId5"/>
+    <p:sldLayoutId id="2147483654" r:id="rId6"/>
+    <p:sldLayoutId id="2147483655" r:id="rId7"/>
+    <p:sldLayoutId id="2147483656" r:id="rId8"/>
+    <p:sldLayoutId id="2147483657" r:id="rId9"/>
+    <p:sldLayoutId id="2147483658" r:id="rId10"/>
   </p:sldLayoutIdLst>
   <p:hf sldNum="0" hdr="0" ftr="0" dt="0"/>
   <p:txStyles>
@@ -6408,7 +6044,7 @@
               <a:buNone/>
             </a:pPr>
             <a:r>
-              <a:rPr lang="en">
+              <a:rPr lang="en" dirty="0">
                 <a:latin typeface="Courier New"/>
                 <a:ea typeface="Courier New"/>
                 <a:cs typeface="Courier New"/>
@@ -6416,7 +6052,7 @@
               </a:rPr>
               <a:t>Wine Quality Analysis</a:t>
             </a:r>
-            <a:endParaRPr>
+            <a:endParaRPr dirty="0">
               <a:latin typeface="Courier New"/>
               <a:ea typeface="Courier New"/>
               <a:cs typeface="Courier New"/>
@@ -6571,14 +6207,19 @@
               <a:buNone/>
             </a:pPr>
             <a:r>
-              <a:rPr lang="en" sz="2630" b="1">
+              <a:rPr lang="en" sz="2630" b="1" dirty="0">
                 <a:solidFill>
                   <a:srgbClr val="24292F"/>
                 </a:solidFill>
+                <a:latin typeface="Courier New" panose="02070309020205020404" pitchFamily="49" charset="0"/>
+                <a:cs typeface="Courier New" panose="02070309020205020404" pitchFamily="49" charset="0"/>
               </a:rPr>
               <a:t>Wine Quality of Vinho Verde in Portugal</a:t>
             </a:r>
-            <a:endParaRPr sz="3620"/>
+            <a:endParaRPr sz="3620" dirty="0">
+              <a:latin typeface="Courier New" panose="02070309020205020404" pitchFamily="49" charset="0"/>
+              <a:cs typeface="Courier New" panose="02070309020205020404" pitchFamily="49" charset="0"/>
+            </a:endParaRPr>
           </a:p>
         </p:txBody>
       </p:sp>
@@ -6815,8 +6456,8 @@
         </p:nvSpPr>
         <p:spPr>
           <a:xfrm>
-            <a:off x="4823828" y="1286562"/>
-            <a:ext cx="3805500" cy="3297786"/>
+            <a:off x="1357808" y="1511184"/>
+            <a:ext cx="6428384" cy="2121132"/>
           </a:xfrm>
           <a:prstGeom prst="rect">
             <a:avLst/>
@@ -7057,13 +6698,13 @@
         <p:spPr>
           <a:xfrm>
             <a:off x="0" y="0"/>
-            <a:ext cx="9173100" cy="568200"/>
+            <a:ext cx="9144000" cy="568200"/>
           </a:xfrm>
           <a:prstGeom prst="rect">
             <a:avLst/>
           </a:prstGeom>
           <a:solidFill>
-            <a:srgbClr val="ECF4FC"/>
+            <a:srgbClr val="73174C"/>
           </a:solidFill>
           <a:ln>
             <a:noFill/>
@@ -7085,92 +6726,22 @@
               <a:buNone/>
             </a:pPr>
             <a:r>
-              <a:rPr lang="en" sz="2500" dirty="0"/>
+              <a:rPr lang="en" sz="2500" b="1" dirty="0">
+                <a:solidFill>
+                  <a:schemeClr val="bg1"/>
+                </a:solidFill>
+                <a:latin typeface="Courier New" panose="02070309020205020404" pitchFamily="49" charset="0"/>
+                <a:cs typeface="Courier New" panose="02070309020205020404" pitchFamily="49" charset="0"/>
+              </a:rPr>
               <a:t>Questions We Hope to Answer</a:t>
             </a:r>
-            <a:endParaRPr sz="2500" dirty="0"/>
-          </a:p>
-        </p:txBody>
-      </p:sp>
-      <p:pic>
-        <p:nvPicPr>
-          <p:cNvPr id="95" name="Google Shape;95;p19"/>
-          <p:cNvPicPr preferRelativeResize="0"/>
-          <p:nvPr/>
-        </p:nvPicPr>
-        <p:blipFill>
-          <a:blip r:embed="rId3">
-            <a:alphaModFix/>
-          </a:blip>
-          <a:stretch>
-            <a:fillRect/>
-          </a:stretch>
-        </p:blipFill>
-        <p:spPr>
-          <a:xfrm>
-            <a:off x="604125" y="612950"/>
-            <a:ext cx="3716049" cy="4111299"/>
-          </a:xfrm>
-          <a:prstGeom prst="rect">
-            <a:avLst/>
-          </a:prstGeom>
-          <a:noFill/>
-          <a:ln>
-            <a:noFill/>
-          </a:ln>
-        </p:spPr>
-      </p:pic>
-      <p:sp>
-        <p:nvSpPr>
-          <p:cNvPr id="96" name="Google Shape;96;p19"/>
-          <p:cNvSpPr txBox="1"/>
-          <p:nvPr/>
-        </p:nvSpPr>
-        <p:spPr>
-          <a:xfrm>
-            <a:off x="868457" y="4584348"/>
-            <a:ext cx="3118327" cy="338524"/>
-          </a:xfrm>
-          <a:prstGeom prst="rect">
-            <a:avLst/>
-          </a:prstGeom>
-          <a:noFill/>
-          <a:ln>
-            <a:noFill/>
-          </a:ln>
-        </p:spPr>
-        <p:txBody>
-          <a:bodyPr spcFirstLastPara="1" wrap="square" lIns="91425" tIns="91425" rIns="91425" bIns="91425" anchor="t" anchorCtr="0">
-            <a:spAutoFit/>
-          </a:bodyPr>
-          <a:lstStyle/>
-          <a:p>
-            <a:pPr marL="0" lvl="0" indent="0" algn="ctr" rtl="0">
-              <a:spcBef>
-                <a:spcPts val="0"/>
-              </a:spcBef>
-              <a:spcAft>
-                <a:spcPts val="0"/>
-              </a:spcAft>
-              <a:buNone/>
-            </a:pPr>
-            <a:r>
-              <a:rPr lang="en" sz="1000" i="1" dirty="0"/>
-              <a:t>[</a:t>
-            </a:r>
-            <a:r>
-              <a:rPr lang="en" sz="1000" i="1" dirty="0">
-                <a:highlight>
-                  <a:srgbClr val="FFFF00"/>
-                </a:highlight>
-              </a:rPr>
-              <a:t>Will replace with our dryness scale from Tableau</a:t>
-            </a:r>
-            <a:r>
-              <a:rPr lang="en" sz="1000" i="1" dirty="0"/>
-              <a:t>]</a:t>
-            </a:r>
-            <a:endParaRPr sz="1000" i="1" dirty="0"/>
+            <a:endParaRPr sz="2500" b="1" dirty="0">
+              <a:solidFill>
+                <a:schemeClr val="bg1"/>
+              </a:solidFill>
+              <a:latin typeface="Courier New" panose="02070309020205020404" pitchFamily="49" charset="0"/>
+              <a:cs typeface="Courier New" panose="02070309020205020404" pitchFamily="49" charset="0"/>
+            </a:endParaRPr>
           </a:p>
         </p:txBody>
       </p:sp>
@@ -7214,7 +6785,7 @@
             <a:avLst/>
           </a:prstGeom>
           <a:solidFill>
-            <a:schemeClr val="dk1"/>
+            <a:srgbClr val="73174C"/>
           </a:solidFill>
           <a:ln>
             <a:noFill/>
@@ -7236,17 +6807,21 @@
               <a:buNone/>
             </a:pPr>
             <a:r>
-              <a:rPr lang="en" sz="2500">
+              <a:rPr lang="en" sz="2500" b="1" dirty="0">
                 <a:solidFill>
                   <a:schemeClr val="lt1"/>
                 </a:solidFill>
+                <a:latin typeface="Courier New" panose="02070309020205020404" pitchFamily="49" charset="0"/>
+                <a:cs typeface="Courier New" panose="02070309020205020404" pitchFamily="49" charset="0"/>
               </a:rPr>
               <a:t>Machine </a:t>
             </a:r>
-            <a:endParaRPr sz="2500">
+            <a:endParaRPr sz="2500" b="1" dirty="0">
               <a:solidFill>
                 <a:schemeClr val="lt1"/>
               </a:solidFill>
+              <a:latin typeface="Courier New" panose="02070309020205020404" pitchFamily="49" charset="0"/>
+              <a:cs typeface="Courier New" panose="02070309020205020404" pitchFamily="49" charset="0"/>
             </a:endParaRPr>
           </a:p>
           <a:p>
@@ -7260,17 +6835,21 @@
               <a:buNone/>
             </a:pPr>
             <a:r>
-              <a:rPr lang="en" sz="2500">
+              <a:rPr lang="en" sz="2500" b="1" dirty="0">
                 <a:solidFill>
                   <a:schemeClr val="lt1"/>
                 </a:solidFill>
+                <a:latin typeface="Courier New" panose="02070309020205020404" pitchFamily="49" charset="0"/>
+                <a:cs typeface="Courier New" panose="02070309020205020404" pitchFamily="49" charset="0"/>
               </a:rPr>
               <a:t>Learning </a:t>
             </a:r>
-            <a:endParaRPr sz="2500">
+            <a:endParaRPr sz="2500" b="1" dirty="0">
               <a:solidFill>
                 <a:schemeClr val="lt1"/>
               </a:solidFill>
+              <a:latin typeface="Courier New" panose="02070309020205020404" pitchFamily="49" charset="0"/>
+              <a:cs typeface="Courier New" panose="02070309020205020404" pitchFamily="49" charset="0"/>
             </a:endParaRPr>
           </a:p>
           <a:p>
@@ -7284,17 +6863,21 @@
               <a:buNone/>
             </a:pPr>
             <a:r>
-              <a:rPr lang="en" sz="2500">
+              <a:rPr lang="en" sz="2500" b="1" dirty="0">
                 <a:solidFill>
                   <a:schemeClr val="lt1"/>
                 </a:solidFill>
+                <a:latin typeface="Courier New" panose="02070309020205020404" pitchFamily="49" charset="0"/>
+                <a:cs typeface="Courier New" panose="02070309020205020404" pitchFamily="49" charset="0"/>
               </a:rPr>
               <a:t>Model</a:t>
             </a:r>
-            <a:endParaRPr sz="2500">
+            <a:endParaRPr sz="2500" b="1" dirty="0">
               <a:solidFill>
                 <a:schemeClr val="lt1"/>
               </a:solidFill>
+              <a:latin typeface="Courier New" panose="02070309020205020404" pitchFamily="49" charset="0"/>
+              <a:cs typeface="Courier New" panose="02070309020205020404" pitchFamily="49" charset="0"/>
             </a:endParaRPr>
           </a:p>
         </p:txBody>
@@ -8183,7 +7766,7 @@
             <a:avLst/>
           </a:prstGeom>
           <a:solidFill>
-            <a:srgbClr val="ECF4FC"/>
+            <a:srgbClr val="73174C"/>
           </a:solidFill>
           <a:ln>
             <a:noFill/>
@@ -8205,10 +7788,22 @@
               <a:buNone/>
             </a:pPr>
             <a:r>
-              <a:rPr lang="en" sz="2500"/>
+              <a:rPr lang="en" sz="2500" b="1" dirty="0">
+                <a:solidFill>
+                  <a:schemeClr val="bg1"/>
+                </a:solidFill>
+                <a:latin typeface="Courier New" panose="02070309020205020404" pitchFamily="49" charset="0"/>
+                <a:cs typeface="Courier New" panose="02070309020205020404" pitchFamily="49" charset="0"/>
+              </a:rPr>
               <a:t>Technologies Used</a:t>
             </a:r>
-            <a:endParaRPr sz="2500"/>
+            <a:endParaRPr sz="2500" b="1" dirty="0">
+              <a:solidFill>
+                <a:schemeClr val="bg1"/>
+              </a:solidFill>
+              <a:latin typeface="Courier New" panose="02070309020205020404" pitchFamily="49" charset="0"/>
+              <a:cs typeface="Courier New" panose="02070309020205020404" pitchFamily="49" charset="0"/>
+            </a:endParaRPr>
           </a:p>
         </p:txBody>
       </p:sp>
@@ -8276,14 +7871,14 @@
               <a:buChar char="❖"/>
             </a:pPr>
             <a:r>
-              <a:rPr lang="en">
+              <a:rPr lang="en" dirty="0">
                 <a:solidFill>
                   <a:schemeClr val="dk1"/>
                 </a:solidFill>
               </a:rPr>
               <a:t>Alcohol</a:t>
             </a:r>
-            <a:endParaRPr>
+            <a:endParaRPr dirty="0">
               <a:solidFill>
                 <a:schemeClr val="dk1"/>
               </a:solidFill>
@@ -8304,14 +7899,14 @@
               <a:buChar char="❖"/>
             </a:pPr>
             <a:r>
-              <a:rPr lang="en">
+              <a:rPr lang="en" dirty="0">
                 <a:solidFill>
                   <a:schemeClr val="dk1"/>
                 </a:solidFill>
               </a:rPr>
               <a:t>Residual (sweet vs dry)</a:t>
             </a:r>
-            <a:endParaRPr>
+            <a:endParaRPr dirty="0">
               <a:solidFill>
                 <a:schemeClr val="dk1"/>
               </a:solidFill>
@@ -8332,7 +7927,7 @@
               <a:buChar char="❖"/>
             </a:pPr>
             <a:r>
-              <a:rPr lang="en">
+              <a:rPr lang="en" dirty="0">
                 <a:solidFill>
                   <a:schemeClr val="dk1"/>
                 </a:solidFill>
@@ -8340,14 +7935,14 @@
               <a:t>Acidity - </a:t>
             </a:r>
             <a:r>
-              <a:rPr lang="en" sz="1400">
+              <a:rPr lang="en" sz="1400" dirty="0">
                 <a:solidFill>
                   <a:schemeClr val="dk1"/>
                 </a:solidFill>
               </a:rPr>
               <a:t>wines that lack fixed acidity are ‘1-dimensional / flat’*</a:t>
             </a:r>
-            <a:endParaRPr>
+            <a:endParaRPr dirty="0">
               <a:solidFill>
                 <a:schemeClr val="dk1"/>
               </a:solidFill>
@@ -8368,14 +7963,14 @@
               <a:buChar char="➢"/>
             </a:pPr>
             <a:r>
-              <a:rPr lang="en">
+              <a:rPr lang="en" dirty="0">
                 <a:solidFill>
                   <a:schemeClr val="dk1"/>
                 </a:solidFill>
               </a:rPr>
               <a:t>Free - higher </a:t>
             </a:r>
-            <a:endParaRPr>
+            <a:endParaRPr dirty="0">
               <a:solidFill>
                 <a:schemeClr val="dk1"/>
               </a:solidFill>
@@ -8396,14 +7991,14 @@
               <a:buChar char="➢"/>
             </a:pPr>
             <a:r>
-              <a:rPr lang="en">
+              <a:rPr lang="en" dirty="0">
                 <a:solidFill>
                   <a:schemeClr val="dk1"/>
                 </a:solidFill>
               </a:rPr>
               <a:t>Fixed (citric acid) - lower amounts may indicate spoilage</a:t>
             </a:r>
-            <a:endParaRPr>
+            <a:endParaRPr dirty="0">
               <a:solidFill>
                 <a:schemeClr val="dk1"/>
               </a:solidFill>
@@ -8424,14 +8019,14 @@
               <a:buChar char="❖"/>
             </a:pPr>
             <a:r>
-              <a:rPr lang="en">
+              <a:rPr lang="en" dirty="0">
                 <a:solidFill>
                   <a:schemeClr val="dk1"/>
                 </a:solidFill>
               </a:rPr>
               <a:t>Sulfur Dioxide</a:t>
             </a:r>
-            <a:endParaRPr>
+            <a:endParaRPr dirty="0">
               <a:solidFill>
                 <a:schemeClr val="dk1"/>
               </a:solidFill>
@@ -8452,14 +8047,14 @@
               <a:buChar char="❖"/>
             </a:pPr>
             <a:r>
-              <a:rPr lang="en">
+              <a:rPr lang="en" dirty="0">
                 <a:solidFill>
                   <a:schemeClr val="dk1"/>
                 </a:solidFill>
               </a:rPr>
               <a:t>Chlorides</a:t>
             </a:r>
-            <a:endParaRPr>
+            <a:endParaRPr dirty="0">
               <a:solidFill>
                 <a:schemeClr val="dk1"/>
               </a:solidFill>
@@ -8482,7 +8077,7 @@
             <a:avLst/>
           </a:prstGeom>
           <a:solidFill>
-            <a:srgbClr val="ECF4FC"/>
+            <a:srgbClr val="73174C"/>
           </a:solidFill>
           <a:ln>
             <a:noFill/>
@@ -8509,14 +8104,22 @@
               <a:buNone/>
             </a:pPr>
             <a:r>
-              <a:rPr lang="en" sz="2500">
-                <a:solidFill>
-                  <a:schemeClr val="dk1"/>
-                </a:solidFill>
+              <a:rPr lang="en" sz="2500" b="1" dirty="0">
+                <a:solidFill>
+                  <a:schemeClr val="bg1"/>
+                </a:solidFill>
+                <a:latin typeface="Courier New" panose="02070309020205020404" pitchFamily="49" charset="0"/>
+                <a:cs typeface="Courier New" panose="02070309020205020404" pitchFamily="49" charset="0"/>
               </a:rPr>
               <a:t>Impacting Variables</a:t>
             </a:r>
-            <a:endParaRPr sz="2500"/>
+            <a:endParaRPr sz="2500" b="1" dirty="0">
+              <a:solidFill>
+                <a:schemeClr val="bg1"/>
+              </a:solidFill>
+              <a:latin typeface="Courier New" panose="02070309020205020404" pitchFamily="49" charset="0"/>
+              <a:cs typeface="Courier New" panose="02070309020205020404" pitchFamily="49" charset="0"/>
+            </a:endParaRPr>
           </a:p>
         </p:txBody>
       </p:sp>
@@ -8560,7 +8163,7 @@
             <a:avLst/>
           </a:prstGeom>
           <a:solidFill>
-            <a:srgbClr val="ECF4FC"/>
+            <a:srgbClr val="73174C"/>
           </a:solidFill>
           <a:ln>
             <a:noFill/>
@@ -8587,14 +8190,22 @@
               <a:buNone/>
             </a:pPr>
             <a:r>
-              <a:rPr lang="en" sz="2500">
-                <a:solidFill>
-                  <a:schemeClr val="dk1"/>
-                </a:solidFill>
+              <a:rPr lang="en" sz="2500" b="1" dirty="0">
+                <a:solidFill>
+                  <a:schemeClr val="bg1"/>
+                </a:solidFill>
+                <a:latin typeface="Courier New" panose="02070309020205020404" pitchFamily="49" charset="0"/>
+                <a:cs typeface="Courier New" panose="02070309020205020404" pitchFamily="49" charset="0"/>
               </a:rPr>
               <a:t>Dashboard Details</a:t>
             </a:r>
-            <a:endParaRPr sz="2500"/>
+            <a:endParaRPr sz="2500" b="1" dirty="0">
+              <a:solidFill>
+                <a:schemeClr val="bg1"/>
+              </a:solidFill>
+              <a:latin typeface="Courier New" panose="02070309020205020404" pitchFamily="49" charset="0"/>
+              <a:cs typeface="Courier New" panose="02070309020205020404" pitchFamily="49" charset="0"/>
+            </a:endParaRPr>
           </a:p>
         </p:txBody>
       </p:sp>
@@ -8610,8 +8221,8 @@
         </p:nvSpPr>
         <p:spPr>
           <a:xfrm>
-            <a:off x="311700" y="927975"/>
-            <a:ext cx="3999900" cy="3416400"/>
+            <a:off x="940309" y="1053103"/>
+            <a:ext cx="7263382" cy="3416400"/>
           </a:xfrm>
           <a:prstGeom prst="rect">
             <a:avLst/>
@@ -8633,14 +8244,14 @@
               <a:buNone/>
             </a:pPr>
             <a:r>
-              <a:rPr lang="en" b="1">
+              <a:rPr lang="en" b="1" dirty="0">
                 <a:solidFill>
                   <a:schemeClr val="dk1"/>
                 </a:solidFill>
               </a:rPr>
               <a:t>Tools:</a:t>
             </a:r>
-            <a:endParaRPr b="1">
+            <a:endParaRPr b="1" dirty="0">
               <a:solidFill>
                 <a:schemeClr val="dk1"/>
               </a:solidFill>
@@ -8661,7 +8272,7 @@
               <a:buChar char="❖"/>
             </a:pPr>
             <a:r>
-              <a:rPr lang="en" sz="1600" b="1">
+              <a:rPr lang="en" sz="1600" b="1" dirty="0">
                 <a:solidFill>
                   <a:schemeClr val="dk1"/>
                 </a:solidFill>
@@ -8669,7 +8280,7 @@
               <a:t>Tableau </a:t>
             </a:r>
             <a:r>
-              <a:rPr lang="en">
+              <a:rPr lang="en" dirty="0">
                 <a:solidFill>
                   <a:schemeClr val="dk1"/>
                 </a:solidFill>
@@ -8677,14 +8288,14 @@
               <a:t>- </a:t>
             </a:r>
             <a:r>
-              <a:rPr lang="en" sz="1400">
+              <a:rPr lang="en" sz="1400" dirty="0">
                 <a:solidFill>
                   <a:schemeClr val="dk1"/>
                 </a:solidFill>
               </a:rPr>
               <a:t>we will be using tableau for our data analysis visualization dashboard.</a:t>
             </a:r>
-            <a:endParaRPr sz="1400">
+            <a:endParaRPr sz="1400" dirty="0">
               <a:solidFill>
                 <a:schemeClr val="dk1"/>
               </a:solidFill>
@@ -8705,7 +8316,7 @@
               <a:buChar char="❖"/>
             </a:pPr>
             <a:r>
-              <a:rPr lang="en" sz="1600" b="1">
+              <a:rPr lang="en" sz="1600" b="1" dirty="0">
                 <a:solidFill>
                   <a:schemeClr val="dk1"/>
                 </a:solidFill>
@@ -8713,7 +8324,7 @@
               <a:t>CSV Raw Data Files</a:t>
             </a:r>
             <a:r>
-              <a:rPr lang="en" sz="1400">
+              <a:rPr lang="en" sz="1400" dirty="0">
                 <a:solidFill>
                   <a:schemeClr val="dk1"/>
                 </a:solidFill>
@@ -8721,7 +8332,7 @@
               <a:t> </a:t>
             </a:r>
             <a:r>
-              <a:rPr lang="en">
+              <a:rPr lang="en" dirty="0">
                 <a:solidFill>
                   <a:schemeClr val="dk1"/>
                 </a:solidFill>
@@ -8729,14 +8340,14 @@
               <a:t>- </a:t>
             </a:r>
             <a:r>
-              <a:rPr lang="en" sz="1400">
+              <a:rPr lang="en" sz="1400" dirty="0">
                 <a:solidFill>
                   <a:schemeClr val="dk1"/>
                 </a:solidFill>
               </a:rPr>
               <a:t>our data will be imported via csv files to utilize in our development of various interactive graphs and charts. </a:t>
             </a:r>
-            <a:endParaRPr sz="1400">
+            <a:endParaRPr sz="1400" dirty="0">
               <a:solidFill>
                 <a:schemeClr val="dk1"/>
               </a:solidFill>
@@ -8746,100 +8357,6 @@
             <a:pPr marL="457200" lvl="0" indent="-330200" algn="l" rtl="0">
               <a:spcBef>
                 <a:spcPts val="0"/>
-              </a:spcBef>
-              <a:spcAft>
-                <a:spcPts val="0"/>
-              </a:spcAft>
-              <a:buClr>
-                <a:schemeClr val="dk1"/>
-              </a:buClr>
-              <a:buSzPts val="1600"/>
-              <a:buChar char="❖"/>
-            </a:pPr>
-            <a:r>
-              <a:rPr lang="en" sz="1600" b="1">
-                <a:solidFill>
-                  <a:schemeClr val="dk1"/>
-                </a:solidFill>
-              </a:rPr>
-              <a:t>Machine Learning Output </a:t>
-            </a:r>
-            <a:r>
-              <a:rPr lang="en" sz="1600">
-                <a:solidFill>
-                  <a:schemeClr val="dk1"/>
-                </a:solidFill>
-              </a:rPr>
-              <a:t>- </a:t>
-            </a:r>
-            <a:r>
-              <a:rPr lang="en" sz="1400">
-                <a:solidFill>
-                  <a:schemeClr val="dk1"/>
-                </a:solidFill>
-              </a:rPr>
-              <a:t>the machine learning output will be saved as a csv file and imported into Tableau.</a:t>
-            </a:r>
-            <a:endParaRPr sz="1400">
-              <a:solidFill>
-                <a:schemeClr val="dk1"/>
-              </a:solidFill>
-            </a:endParaRPr>
-          </a:p>
-        </p:txBody>
-      </p:sp>
-      <p:sp>
-        <p:nvSpPr>
-          <p:cNvPr id="88" name="Google Shape;88;p18"/>
-          <p:cNvSpPr txBox="1">
-            <a:spLocks noGrp="1"/>
-          </p:cNvSpPr>
-          <p:nvPr>
-            <p:ph type="body" idx="4294967295"/>
-          </p:nvPr>
-        </p:nvSpPr>
-        <p:spPr>
-          <a:xfrm>
-            <a:off x="4572000" y="934235"/>
-            <a:ext cx="3999900" cy="3416400"/>
-          </a:xfrm>
-          <a:prstGeom prst="rect">
-            <a:avLst/>
-          </a:prstGeom>
-        </p:spPr>
-        <p:txBody>
-          <a:bodyPr spcFirstLastPara="1" wrap="square" lIns="91425" tIns="91425" rIns="91425" bIns="91425" anchor="t" anchorCtr="0">
-            <a:normAutofit/>
-          </a:bodyPr>
-          <a:lstStyle/>
-          <a:p>
-            <a:pPr marL="0" lvl="0" indent="0" algn="l" rtl="0">
-              <a:spcBef>
-                <a:spcPts val="0"/>
-              </a:spcBef>
-              <a:spcAft>
-                <a:spcPts val="0"/>
-              </a:spcAft>
-              <a:buNone/>
-            </a:pPr>
-            <a:r>
-              <a:rPr lang="en" b="1" dirty="0">
-                <a:solidFill>
-                  <a:schemeClr val="dk1"/>
-                </a:solidFill>
-              </a:rPr>
-              <a:t>Interactive Element:</a:t>
-            </a:r>
-            <a:endParaRPr b="1" dirty="0">
-              <a:solidFill>
-                <a:schemeClr val="dk1"/>
-              </a:solidFill>
-            </a:endParaRPr>
-          </a:p>
-          <a:p>
-            <a:pPr marL="457200" lvl="0" indent="-330200" algn="l" rtl="0">
-              <a:spcBef>
-                <a:spcPts val="1200"/>
               </a:spcBef>
               <a:spcAft>
                 <a:spcPts val="0"/>
@@ -8856,7 +8373,7 @@
                   <a:schemeClr val="dk1"/>
                 </a:solidFill>
               </a:rPr>
-              <a:t>Scale Diagram </a:t>
+              <a:t>Machine Learning Output </a:t>
             </a:r>
             <a:r>
               <a:rPr lang="en" sz="1600" dirty="0">
@@ -8872,81 +8389,9 @@
                   <a:schemeClr val="dk1"/>
                 </a:solidFill>
               </a:rPr>
-              <a:t>this will be a diagram comparing how residual sugar levels provide to the sweetness vs dryness of a wine.</a:t>
+              <a:t>the machine learning output will be saved as a csv file and imported into Tableau.</a:t>
             </a:r>
             <a:endParaRPr sz="1400" dirty="0">
-              <a:solidFill>
-                <a:schemeClr val="dk1"/>
-              </a:solidFill>
-            </a:endParaRPr>
-          </a:p>
-          <a:p>
-            <a:pPr marL="457200" lvl="0" indent="-330200" algn="l" rtl="0">
-              <a:spcBef>
-                <a:spcPts val="0"/>
-              </a:spcBef>
-              <a:spcAft>
-                <a:spcPts val="0"/>
-              </a:spcAft>
-              <a:buClr>
-                <a:schemeClr val="dk1"/>
-              </a:buClr>
-              <a:buSzPts val="1600"/>
-              <a:buChar char="❖"/>
-            </a:pPr>
-            <a:r>
-              <a:rPr lang="en" sz="1600" b="1" dirty="0">
-                <a:solidFill>
-                  <a:schemeClr val="dk1"/>
-                </a:solidFill>
-              </a:rPr>
-              <a:t>Line/Bar Graph </a:t>
-            </a:r>
-            <a:r>
-              <a:rPr lang="en" sz="1600" dirty="0">
-                <a:solidFill>
-                  <a:schemeClr val="dk1"/>
-                </a:solidFill>
-              </a:rPr>
-              <a:t>- </a:t>
-            </a:r>
-            <a:r>
-              <a:rPr lang="en" sz="1400" dirty="0">
-                <a:solidFill>
-                  <a:schemeClr val="dk1"/>
-                </a:solidFill>
-              </a:rPr>
-              <a:t>to show how certain chemicals properties contribute to the quality of wines. </a:t>
-            </a:r>
-            <a:endParaRPr sz="1400" dirty="0">
-              <a:solidFill>
-                <a:schemeClr val="dk1"/>
-              </a:solidFill>
-            </a:endParaRPr>
-          </a:p>
-          <a:p>
-            <a:pPr marL="914400" lvl="1" indent="-304800" algn="l" rtl="0">
-              <a:spcBef>
-                <a:spcPts val="0"/>
-              </a:spcBef>
-              <a:spcAft>
-                <a:spcPts val="0"/>
-              </a:spcAft>
-              <a:buClr>
-                <a:schemeClr val="dk1"/>
-              </a:buClr>
-              <a:buSzPts val="1200"/>
-              <a:buChar char="➢"/>
-            </a:pPr>
-            <a:r>
-              <a:rPr lang="en" sz="1200" dirty="0">
-                <a:solidFill>
-                  <a:schemeClr val="dk1"/>
-                </a:solidFill>
-              </a:rPr>
-              <a:t>For example, when you take out alcohol what is the quality score versus when you include alcohol?</a:t>
-            </a:r>
-            <a:endParaRPr sz="1200" dirty="0">
               <a:solidFill>
                 <a:schemeClr val="dk1"/>
               </a:solidFill>
@@ -8967,7 +8412,7 @@
   <p:cSld>
     <p:spTree>
       <p:nvGrpSpPr>
-        <p:cNvPr id="1" name="Shape 100"/>
+        <p:cNvPr id="1" name="Shape 85"/>
         <p:cNvGrpSpPr/>
         <p:nvPr/>
       </p:nvGrpSpPr>
@@ -8981,18 +8426,79 @@
       </p:grpSpPr>
       <p:sp>
         <p:nvSpPr>
-          <p:cNvPr id="101" name="Google Shape;101;p20"/>
+          <p:cNvPr id="86" name="Google Shape;86;p18"/>
+          <p:cNvSpPr/>
+          <p:nvPr/>
+        </p:nvSpPr>
+        <p:spPr>
+          <a:xfrm>
+            <a:off x="0" y="0"/>
+            <a:ext cx="9144000" cy="463800"/>
+          </a:xfrm>
+          <a:prstGeom prst="rect">
+            <a:avLst/>
+          </a:prstGeom>
+          <a:solidFill>
+            <a:srgbClr val="73174C"/>
+          </a:solidFill>
+          <a:ln>
+            <a:noFill/>
+          </a:ln>
+        </p:spPr>
+        <p:txBody>
+          <a:bodyPr spcFirstLastPara="1" wrap="square" lIns="91425" tIns="91425" rIns="91425" bIns="91425" anchor="ctr" anchorCtr="0">
+            <a:noAutofit/>
+          </a:bodyPr>
+          <a:lstStyle/>
+          <a:p>
+            <a:pPr marL="0" lvl="0" indent="0" algn="l" rtl="0">
+              <a:spcBef>
+                <a:spcPts val="0"/>
+              </a:spcBef>
+              <a:spcAft>
+                <a:spcPts val="0"/>
+              </a:spcAft>
+              <a:buClr>
+                <a:schemeClr val="dk1"/>
+              </a:buClr>
+              <a:buSzPts val="1100"/>
+              <a:buFont typeface="Arial"/>
+              <a:buNone/>
+            </a:pPr>
+            <a:r>
+              <a:rPr lang="en" sz="2500" b="1" dirty="0">
+                <a:solidFill>
+                  <a:schemeClr val="bg1"/>
+                </a:solidFill>
+                <a:latin typeface="Courier New" panose="02070309020205020404" pitchFamily="49" charset="0"/>
+                <a:cs typeface="Courier New" panose="02070309020205020404" pitchFamily="49" charset="0"/>
+              </a:rPr>
+              <a:t>Dashboard Details</a:t>
+            </a:r>
+            <a:endParaRPr sz="2500" b="1" dirty="0">
+              <a:solidFill>
+                <a:schemeClr val="bg1"/>
+              </a:solidFill>
+              <a:latin typeface="Courier New" panose="02070309020205020404" pitchFamily="49" charset="0"/>
+              <a:cs typeface="Courier New" panose="02070309020205020404" pitchFamily="49" charset="0"/>
+            </a:endParaRPr>
+          </a:p>
+        </p:txBody>
+      </p:sp>
+      <p:sp>
+        <p:nvSpPr>
+          <p:cNvPr id="88" name="Google Shape;88;p18"/>
           <p:cNvSpPr txBox="1">
             <a:spLocks noGrp="1"/>
           </p:cNvSpPr>
           <p:nvPr>
-            <p:ph type="body" idx="1"/>
+            <p:ph type="body" idx="4294967295"/>
           </p:nvPr>
         </p:nvSpPr>
         <p:spPr>
           <a:xfrm>
-            <a:off x="311700" y="1152475"/>
-            <a:ext cx="3999900" cy="3416400"/>
+            <a:off x="198463" y="863550"/>
+            <a:ext cx="2373086" cy="3416400"/>
           </a:xfrm>
           <a:prstGeom prst="rect">
             <a:avLst/>
@@ -9000,265 +8506,266 @@
         </p:spPr>
         <p:txBody>
           <a:bodyPr spcFirstLastPara="1" wrap="square" lIns="91425" tIns="91425" rIns="91425" bIns="91425" anchor="t" anchorCtr="0">
-            <a:normAutofit/>
+            <a:normAutofit fontScale="92500"/>
           </a:bodyPr>
           <a:lstStyle/>
           <a:p>
-            <a:pPr marL="457200" lvl="0" indent="-323850" algn="l" rtl="0">
-              <a:lnSpc>
-                <a:spcPct val="150000"/>
-              </a:lnSpc>
-              <a:spcBef>
-                <a:spcPts val="1600"/>
-              </a:spcBef>
-              <a:spcAft>
-                <a:spcPts val="0"/>
-              </a:spcAft>
-              <a:buClr>
-                <a:srgbClr val="2B2B2B"/>
-              </a:buClr>
-              <a:buSzPts val="1500"/>
-              <a:buFont typeface="Roboto"/>
-              <a:buChar char="●"/>
+            <a:pPr marL="0" lvl="0" indent="0" algn="l" rtl="0">
+              <a:spcBef>
+                <a:spcPts val="0"/>
+              </a:spcBef>
+              <a:spcAft>
+                <a:spcPts val="0"/>
+              </a:spcAft>
+              <a:buNone/>
             </a:pPr>
             <a:r>
-              <a:rPr lang="en" sz="1500">
-                <a:solidFill>
-                  <a:srgbClr val="2B2B2B"/>
-                </a:solidFill>
-                <a:latin typeface="Roboto"/>
-                <a:ea typeface="Roboto"/>
-                <a:cs typeface="Roboto"/>
-                <a:sym typeface="Roboto"/>
+              <a:rPr lang="en" b="1" dirty="0">
+                <a:solidFill>
+                  <a:schemeClr val="dk1"/>
+                </a:solidFill>
               </a:rPr>
-              <a:t>Selected topic</a:t>
+              <a:t>Interactive Element:</a:t>
             </a:r>
-            <a:endParaRPr sz="1500">
+            <a:endParaRPr b="1" dirty="0">
               <a:solidFill>
-                <a:srgbClr val="2B2B2B"/>
+                <a:schemeClr val="dk1"/>
               </a:solidFill>
-              <a:latin typeface="Roboto"/>
-              <a:ea typeface="Roboto"/>
-              <a:cs typeface="Roboto"/>
-              <a:sym typeface="Roboto"/>
             </a:endParaRPr>
           </a:p>
           <a:p>
-            <a:pPr marL="457200" lvl="0" indent="-323850" algn="l" rtl="0">
-              <a:lnSpc>
-                <a:spcPct val="150000"/>
-              </a:lnSpc>
-              <a:spcBef>
-                <a:spcPts val="0"/>
+            <a:pPr marL="457200" lvl="0" indent="-330200" algn="l" rtl="0">
+              <a:spcBef>
+                <a:spcPts val="1200"/>
               </a:spcBef>
               <a:spcAft>
                 <a:spcPts val="0"/>
               </a:spcAft>
               <a:buClr>
-                <a:srgbClr val="2B2B2B"/>
+                <a:schemeClr val="dk1"/>
               </a:buClr>
-              <a:buSzPts val="1500"/>
-              <a:buFont typeface="Roboto"/>
-              <a:buChar char="●"/>
+              <a:buSzPts val="1600"/>
+              <a:buChar char="❖"/>
             </a:pPr>
             <a:r>
-              <a:rPr lang="en" sz="1500">
-                <a:solidFill>
-                  <a:srgbClr val="2B2B2B"/>
-                </a:solidFill>
-                <a:latin typeface="Roboto"/>
-                <a:ea typeface="Roboto"/>
-                <a:cs typeface="Roboto"/>
-                <a:sym typeface="Roboto"/>
+              <a:rPr lang="en" sz="1400" b="1" dirty="0">
+                <a:solidFill>
+                  <a:schemeClr val="dk1"/>
+                </a:solidFill>
               </a:rPr>
-              <a:t>Reason topic was selected</a:t>
+              <a:t>Scale Diagram </a:t>
             </a:r>
-            <a:endParaRPr sz="1500">
-              <a:solidFill>
-                <a:srgbClr val="2B2B2B"/>
-              </a:solidFill>
-              <a:latin typeface="Roboto"/>
-              <a:ea typeface="Roboto"/>
-              <a:cs typeface="Roboto"/>
-              <a:sym typeface="Roboto"/>
-            </a:endParaRPr>
-          </a:p>
-          <a:p>
-            <a:pPr marL="457200" lvl="0" indent="-323850" algn="l" rtl="0">
-              <a:lnSpc>
-                <a:spcPct val="150000"/>
-              </a:lnSpc>
-              <a:spcBef>
-                <a:spcPts val="0"/>
+            <a:r>
+              <a:rPr lang="en" sz="1400" dirty="0">
+                <a:solidFill>
+                  <a:schemeClr val="dk1"/>
+                </a:solidFill>
+              </a:rPr>
+              <a:t>- this will be a diagram comparing how residual sugar levels provide to the sweetness vs dryness of a wine.</a:t>
+            </a:r>
+          </a:p>
+          <a:p>
+            <a:pPr marL="457200" lvl="0" indent="-330200" algn="l" rtl="0">
+              <a:spcBef>
+                <a:spcPts val="1200"/>
               </a:spcBef>
               <a:spcAft>
                 <a:spcPts val="0"/>
               </a:spcAft>
               <a:buClr>
-                <a:srgbClr val="2B2B2B"/>
+                <a:schemeClr val="dk1"/>
               </a:buClr>
-              <a:buSzPts val="1500"/>
-              <a:buFont typeface="Roboto"/>
-              <a:buChar char="●"/>
+              <a:buSzPts val="1600"/>
+              <a:buChar char="❖"/>
             </a:pPr>
             <a:r>
-              <a:rPr lang="en" sz="1500">
-                <a:solidFill>
-                  <a:srgbClr val="2B2B2B"/>
-                </a:solidFill>
-                <a:latin typeface="Roboto"/>
-                <a:ea typeface="Roboto"/>
-                <a:cs typeface="Roboto"/>
-                <a:sym typeface="Roboto"/>
+              <a:rPr lang="en" sz="1400" b="1" dirty="0">
+                <a:solidFill>
+                  <a:schemeClr val="dk1"/>
+                </a:solidFill>
               </a:rPr>
-              <a:t>Description of the source of data</a:t>
+              <a:t>Link to Dashboard:</a:t>
             </a:r>
-            <a:endParaRPr sz="1500">
+            <a:r>
+              <a:rPr lang="en" sz="1400" dirty="0">
+                <a:solidFill>
+                  <a:schemeClr val="dk1"/>
+                </a:solidFill>
+              </a:rPr>
+              <a:t> </a:t>
+            </a:r>
+            <a:r>
+              <a:rPr lang="en-US" sz="1100" dirty="0">
+                <a:solidFill>
+                  <a:schemeClr val="dk1"/>
+                </a:solidFill>
+                <a:hlinkClick r:id="rId3"/>
+              </a:rPr>
+              <a:t>https://public.tableau.com/app/profile/mara.valenzuela8787/viz/WineQualityAnalysisDashboard/Dashboard1?publish=yes</a:t>
+            </a:r>
+            <a:endParaRPr lang="en" sz="1100" b="1" dirty="0">
               <a:solidFill>
-                <a:srgbClr val="2B2B2B"/>
+                <a:schemeClr val="dk1"/>
               </a:solidFill>
-              <a:latin typeface="Roboto"/>
-              <a:ea typeface="Roboto"/>
-              <a:cs typeface="Roboto"/>
-              <a:sym typeface="Roboto"/>
             </a:endParaRPr>
           </a:p>
           <a:p>
-            <a:pPr marL="457200" lvl="0" indent="-323850" algn="l" rtl="0">
-              <a:lnSpc>
-                <a:spcPct val="150000"/>
-              </a:lnSpc>
-              <a:spcBef>
-                <a:spcPts val="0"/>
+            <a:pPr marL="127000" lvl="0" indent="0" algn="l" rtl="0">
+              <a:spcBef>
+                <a:spcPts val="1200"/>
               </a:spcBef>
               <a:spcAft>
                 <a:spcPts val="0"/>
               </a:spcAft>
               <a:buClr>
-                <a:srgbClr val="2B2B2B"/>
+                <a:schemeClr val="dk1"/>
               </a:buClr>
-              <a:buSzPts val="1500"/>
-              <a:buFont typeface="Roboto"/>
-              <a:buChar char="●"/>
+              <a:buSzPts val="1600"/>
+              <a:buNone/>
+            </a:pPr>
+            <a:endParaRPr sz="1400" dirty="0">
+              <a:solidFill>
+                <a:schemeClr val="dk1"/>
+              </a:solidFill>
+            </a:endParaRPr>
+          </a:p>
+        </p:txBody>
+      </p:sp>
+      <p:pic>
+        <p:nvPicPr>
+          <p:cNvPr id="5" name="Picture 4">
+            <a:extLst>
+              <a:ext uri="{FF2B5EF4-FFF2-40B4-BE49-F238E27FC236}">
+                <a16:creationId xmlns:a16="http://schemas.microsoft.com/office/drawing/2014/main" id="{F831D0B1-1D10-48E2-8EBE-1A4BEB9C44F6}"/>
+              </a:ext>
+            </a:extLst>
+          </p:cNvPr>
+          <p:cNvPicPr>
+            <a:picLocks noChangeAspect="1"/>
+          </p:cNvPicPr>
+          <p:nvPr/>
+        </p:nvPicPr>
+        <p:blipFill>
+          <a:blip r:embed="rId4"/>
+          <a:stretch>
+            <a:fillRect/>
+          </a:stretch>
+        </p:blipFill>
+        <p:spPr>
+          <a:xfrm>
+            <a:off x="2743200" y="863550"/>
+            <a:ext cx="5947966" cy="3866821"/>
+          </a:xfrm>
+          <a:prstGeom prst="rect">
+            <a:avLst/>
+          </a:prstGeom>
+        </p:spPr>
+      </p:pic>
+    </p:spTree>
+    <p:extLst>
+      <p:ext uri="{BB962C8B-B14F-4D97-AF65-F5344CB8AC3E}">
+        <p14:creationId xmlns:p14="http://schemas.microsoft.com/office/powerpoint/2010/main" val="1917869905"/>
+      </p:ext>
+    </p:extLst>
+  </p:cSld>
+  <p:clrMapOvr>
+    <a:masterClrMapping/>
+  </p:clrMapOvr>
+</p:sld>
+</file>
+
+<file path=ppt/slides/slide9.xml><?xml version="1.0" encoding="utf-8"?>
+<p:sld xmlns:a="http://schemas.openxmlformats.org/drawingml/2006/main" xmlns:r="http://schemas.openxmlformats.org/officeDocument/2006/relationships" xmlns:p="http://schemas.openxmlformats.org/presentationml/2006/main">
+  <p:cSld>
+    <p:spTree>
+      <p:nvGrpSpPr>
+        <p:cNvPr id="1" name="Shape 85"/>
+        <p:cNvGrpSpPr/>
+        <p:nvPr/>
+      </p:nvGrpSpPr>
+      <p:grpSpPr>
+        <a:xfrm>
+          <a:off x="0" y="0"/>
+          <a:ext cx="0" cy="0"/>
+          <a:chOff x="0" y="0"/>
+          <a:chExt cx="0" cy="0"/>
+        </a:xfrm>
+      </p:grpSpPr>
+      <p:sp>
+        <p:nvSpPr>
+          <p:cNvPr id="86" name="Google Shape;86;p18"/>
+          <p:cNvSpPr/>
+          <p:nvPr/>
+        </p:nvSpPr>
+        <p:spPr>
+          <a:xfrm>
+            <a:off x="0" y="0"/>
+            <a:ext cx="9144000" cy="463800"/>
+          </a:xfrm>
+          <a:prstGeom prst="rect">
+            <a:avLst/>
+          </a:prstGeom>
+          <a:solidFill>
+            <a:srgbClr val="73174C"/>
+          </a:solidFill>
+          <a:ln>
+            <a:noFill/>
+          </a:ln>
+        </p:spPr>
+        <p:txBody>
+          <a:bodyPr spcFirstLastPara="1" wrap="square" lIns="91425" tIns="91425" rIns="91425" bIns="91425" anchor="ctr" anchorCtr="0">
+            <a:noAutofit/>
+          </a:bodyPr>
+          <a:lstStyle/>
+          <a:p>
+            <a:pPr marL="0" lvl="0" indent="0" algn="l" rtl="0">
+              <a:spcBef>
+                <a:spcPts val="0"/>
+              </a:spcBef>
+              <a:spcAft>
+                <a:spcPts val="0"/>
+              </a:spcAft>
+              <a:buClr>
+                <a:schemeClr val="dk1"/>
+              </a:buClr>
+              <a:buSzPts val="1100"/>
+              <a:buFont typeface="Arial"/>
+              <a:buNone/>
             </a:pPr>
             <a:r>
-              <a:rPr lang="en" sz="1500">
-                <a:solidFill>
-                  <a:srgbClr val="2B2B2B"/>
-                </a:solidFill>
-                <a:latin typeface="Roboto"/>
-                <a:ea typeface="Roboto"/>
-                <a:cs typeface="Roboto"/>
-                <a:sym typeface="Roboto"/>
+              <a:rPr lang="en" sz="2500" b="1" dirty="0">
+                <a:solidFill>
+                  <a:schemeClr val="bg1"/>
+                </a:solidFill>
+                <a:latin typeface="Courier New" panose="02070309020205020404" pitchFamily="49" charset="0"/>
+                <a:cs typeface="Courier New" panose="02070309020205020404" pitchFamily="49" charset="0"/>
               </a:rPr>
-              <a:t>Questions the team hopes to answer with the data</a:t>
+              <a:t>Results of the Analysis</a:t>
             </a:r>
-            <a:endParaRPr sz="1500">
+            <a:endParaRPr sz="2500" b="1" dirty="0">
               <a:solidFill>
-                <a:srgbClr val="2B2B2B"/>
+                <a:schemeClr val="bg1"/>
               </a:solidFill>
-              <a:latin typeface="Roboto"/>
-              <a:ea typeface="Roboto"/>
-              <a:cs typeface="Roboto"/>
-              <a:sym typeface="Roboto"/>
-            </a:endParaRPr>
-          </a:p>
-          <a:p>
-            <a:pPr marL="457200" lvl="0" indent="-323850" algn="l" rtl="0">
-              <a:lnSpc>
-                <a:spcPct val="150000"/>
-              </a:lnSpc>
-              <a:spcBef>
-                <a:spcPts val="0"/>
-              </a:spcBef>
-              <a:spcAft>
-                <a:spcPts val="0"/>
-              </a:spcAft>
-              <a:buClr>
-                <a:srgbClr val="2B2B2B"/>
-              </a:buClr>
-              <a:buSzPts val="1500"/>
-              <a:buFont typeface="Roboto"/>
-              <a:buChar char="●"/>
-            </a:pPr>
-            <a:r>
-              <a:rPr lang="en" sz="1500">
-                <a:solidFill>
-                  <a:srgbClr val="2B2B2B"/>
-                </a:solidFill>
-                <a:latin typeface="Roboto"/>
-                <a:ea typeface="Roboto"/>
-                <a:cs typeface="Roboto"/>
-                <a:sym typeface="Roboto"/>
-              </a:rPr>
-              <a:t>Description of the data exploration phase of the project</a:t>
-            </a:r>
-            <a:endParaRPr sz="1500">
-              <a:solidFill>
-                <a:srgbClr val="2B2B2B"/>
-              </a:solidFill>
-              <a:latin typeface="Roboto"/>
-              <a:ea typeface="Roboto"/>
-              <a:cs typeface="Roboto"/>
-              <a:sym typeface="Roboto"/>
-            </a:endParaRPr>
-          </a:p>
-          <a:p>
-            <a:pPr marL="457200" lvl="0" indent="-323850" algn="l" rtl="0">
-              <a:lnSpc>
-                <a:spcPct val="150000"/>
-              </a:lnSpc>
-              <a:spcBef>
-                <a:spcPts val="0"/>
-              </a:spcBef>
-              <a:spcAft>
-                <a:spcPts val="0"/>
-              </a:spcAft>
-              <a:buClr>
-                <a:srgbClr val="2B2B2B"/>
-              </a:buClr>
-              <a:buSzPts val="1500"/>
-              <a:buFont typeface="Roboto"/>
-              <a:buChar char="●"/>
-            </a:pPr>
-            <a:r>
-              <a:rPr lang="en" sz="1500">
-                <a:solidFill>
-                  <a:srgbClr val="2B2B2B"/>
-                </a:solidFill>
-                <a:latin typeface="Roboto"/>
-                <a:ea typeface="Roboto"/>
-                <a:cs typeface="Roboto"/>
-                <a:sym typeface="Roboto"/>
-              </a:rPr>
-              <a:t>Description of the analysis phase of the project</a:t>
-            </a:r>
-            <a:endParaRPr sz="1500">
-              <a:solidFill>
-                <a:srgbClr val="2B2B2B"/>
-              </a:solidFill>
-              <a:latin typeface="Roboto"/>
-              <a:ea typeface="Roboto"/>
-              <a:cs typeface="Roboto"/>
-              <a:sym typeface="Roboto"/>
+              <a:latin typeface="Courier New" panose="02070309020205020404" pitchFamily="49" charset="0"/>
+              <a:cs typeface="Courier New" panose="02070309020205020404" pitchFamily="49" charset="0"/>
             </a:endParaRPr>
           </a:p>
         </p:txBody>
       </p:sp>
       <p:sp>
         <p:nvSpPr>
-          <p:cNvPr id="102" name="Google Shape;102;p20"/>
+          <p:cNvPr id="88" name="Google Shape;88;p18"/>
           <p:cNvSpPr txBox="1">
             <a:spLocks noGrp="1"/>
           </p:cNvSpPr>
           <p:nvPr>
-            <p:ph type="title"/>
+            <p:ph type="body" idx="4294967295"/>
           </p:nvPr>
         </p:nvSpPr>
         <p:spPr>
           <a:xfrm>
-            <a:off x="311700" y="445025"/>
-            <a:ext cx="8520600" cy="572700"/>
+            <a:off x="337456" y="754693"/>
+            <a:ext cx="8469087" cy="3416400"/>
           </a:xfrm>
           <a:prstGeom prst="rect">
             <a:avLst/>
@@ -9266,28 +8773,257 @@
         </p:spPr>
         <p:txBody>
           <a:bodyPr spcFirstLastPara="1" wrap="square" lIns="91425" tIns="91425" rIns="91425" bIns="91425" anchor="t" anchorCtr="0">
-            <a:normAutofit fontScale="90000"/>
+            <a:normAutofit fontScale="92500" lnSpcReduction="10000"/>
           </a:bodyPr>
           <a:lstStyle/>
           <a:p>
-            <a:pPr marL="0" lvl="0" indent="0" algn="l" rtl="0">
-              <a:spcBef>
-                <a:spcPts val="0"/>
-              </a:spcBef>
-              <a:spcAft>
-                <a:spcPts val="0"/>
-              </a:spcAft>
-              <a:buNone/>
+            <a:pPr marL="457200" lvl="0" indent="-330200" algn="l" rtl="0">
+              <a:spcBef>
+                <a:spcPts val="1200"/>
+              </a:spcBef>
+              <a:spcAft>
+                <a:spcPts val="0"/>
+              </a:spcAft>
+              <a:buClr>
+                <a:schemeClr val="dk1"/>
+              </a:buClr>
+              <a:buSzPts val="1600"/>
+              <a:buChar char="❖"/>
             </a:pPr>
             <a:r>
-              <a:rPr lang="en"/>
-              <a:t>Rubric Outline (Segment II)</a:t>
+              <a:rPr lang="en" sz="1400" b="1" dirty="0">
+                <a:solidFill>
+                  <a:schemeClr val="dk1"/>
+                </a:solidFill>
+              </a:rPr>
+              <a:t>Overview: </a:t>
             </a:r>
-            <a:endParaRPr/>
+            <a:r>
+              <a:rPr lang="en" sz="1400" dirty="0">
+                <a:solidFill>
+                  <a:schemeClr val="dk1"/>
+                </a:solidFill>
+              </a:rPr>
+              <a:t>We performed a machine learning model using logistic regression to predict the quality scores of red and white wine based on 11 characterstics, such as </a:t>
+            </a:r>
+            <a:r>
+              <a:rPr lang="en" sz="1400" i="1" dirty="0">
+                <a:solidFill>
+                  <a:schemeClr val="dk1"/>
+                </a:solidFill>
+              </a:rPr>
+              <a:t>fixed acidity, citric acid, alcohol, sulfure dioxide</a:t>
+            </a:r>
+            <a:r>
+              <a:rPr lang="en" sz="1400" dirty="0">
+                <a:solidFill>
+                  <a:schemeClr val="dk1"/>
+                </a:solidFill>
+              </a:rPr>
+              <a:t>. </a:t>
+            </a:r>
+            <a:endParaRPr lang="en" sz="1400" b="1" dirty="0">
+              <a:solidFill>
+                <a:schemeClr val="dk1"/>
+              </a:solidFill>
+            </a:endParaRPr>
+          </a:p>
+          <a:p>
+            <a:pPr marL="457200" lvl="0" indent="-330200" algn="l" rtl="0">
+              <a:spcBef>
+                <a:spcPts val="1200"/>
+              </a:spcBef>
+              <a:spcAft>
+                <a:spcPts val="0"/>
+              </a:spcAft>
+              <a:buClr>
+                <a:schemeClr val="dk1"/>
+              </a:buClr>
+              <a:buSzPts val="1600"/>
+              <a:buChar char="❖"/>
+            </a:pPr>
+            <a:r>
+              <a:rPr lang="en" sz="1400" b="1" dirty="0">
+                <a:solidFill>
+                  <a:schemeClr val="dk1"/>
+                </a:solidFill>
+              </a:rPr>
+              <a:t>Analysis: </a:t>
+            </a:r>
+            <a:r>
+              <a:rPr lang="en" sz="1400" dirty="0">
+                <a:solidFill>
+                  <a:schemeClr val="dk1"/>
+                </a:solidFill>
+              </a:rPr>
+              <a:t>T</a:t>
+            </a:r>
+            <a:r>
+              <a:rPr lang="en-US" sz="1400" dirty="0">
+                <a:solidFill>
+                  <a:schemeClr val="dk1"/>
+                </a:solidFill>
+              </a:rPr>
+              <a:t>he</a:t>
+            </a:r>
+            <a:r>
+              <a:rPr lang="en" sz="1400" dirty="0">
+                <a:solidFill>
+                  <a:schemeClr val="dk1"/>
+                </a:solidFill>
+              </a:rPr>
+              <a:t> result of our analysis based off the logistic regression model provided us with outcomes of quality scores. Our model prediction accuracy came out to be 0.54, which was a bit lower than what we expected. However, based on this accuracy score we can assume that the features within the dataset do not contribute greatly to the quality of wine. </a:t>
+            </a:r>
+          </a:p>
+          <a:p>
+            <a:pPr marL="127000" lvl="0" indent="0" algn="l" rtl="0">
+              <a:spcBef>
+                <a:spcPts val="1200"/>
+              </a:spcBef>
+              <a:spcAft>
+                <a:spcPts val="0"/>
+              </a:spcAft>
+              <a:buClr>
+                <a:schemeClr val="dk1"/>
+              </a:buClr>
+              <a:buSzPts val="1600"/>
+              <a:buNone/>
+            </a:pPr>
+            <a:endParaRPr lang="en" sz="1400" dirty="0">
+              <a:solidFill>
+                <a:schemeClr val="dk1"/>
+              </a:solidFill>
+            </a:endParaRPr>
+          </a:p>
+          <a:p>
+            <a:pPr marL="457200" lvl="0" indent="-330200" algn="l" rtl="0">
+              <a:spcBef>
+                <a:spcPts val="1200"/>
+              </a:spcBef>
+              <a:spcAft>
+                <a:spcPts val="0"/>
+              </a:spcAft>
+              <a:buClr>
+                <a:schemeClr val="dk1"/>
+              </a:buClr>
+              <a:buSzPts val="1600"/>
+              <a:buChar char="❖"/>
+            </a:pPr>
+            <a:endParaRPr lang="en" sz="1400" b="1" dirty="0">
+              <a:solidFill>
+                <a:schemeClr val="dk1"/>
+              </a:solidFill>
+            </a:endParaRPr>
+          </a:p>
+          <a:p>
+            <a:pPr marL="457200" lvl="0" indent="-330200" algn="l" rtl="0">
+              <a:spcBef>
+                <a:spcPts val="1200"/>
+              </a:spcBef>
+              <a:spcAft>
+                <a:spcPts val="0"/>
+              </a:spcAft>
+              <a:buClr>
+                <a:schemeClr val="dk1"/>
+              </a:buClr>
+              <a:buSzPts val="1600"/>
+              <a:buChar char="❖"/>
+            </a:pPr>
+            <a:endParaRPr lang="en" sz="1400" b="1" dirty="0">
+              <a:solidFill>
+                <a:schemeClr val="dk1"/>
+              </a:solidFill>
+            </a:endParaRPr>
+          </a:p>
+          <a:p>
+            <a:pPr marL="457200" lvl="0" indent="-330200" algn="l" rtl="0">
+              <a:spcBef>
+                <a:spcPts val="1200"/>
+              </a:spcBef>
+              <a:spcAft>
+                <a:spcPts val="0"/>
+              </a:spcAft>
+              <a:buClr>
+                <a:schemeClr val="dk1"/>
+              </a:buClr>
+              <a:buSzPts val="1600"/>
+              <a:buChar char="❖"/>
+            </a:pPr>
+            <a:r>
+              <a:rPr lang="en" sz="1400" b="1" dirty="0">
+                <a:solidFill>
+                  <a:schemeClr val="dk1"/>
+                </a:solidFill>
+              </a:rPr>
+              <a:t>Recommendation for Future Analysis: </a:t>
+            </a:r>
+            <a:r>
+              <a:rPr lang="en" sz="1400" dirty="0">
+                <a:solidFill>
+                  <a:schemeClr val="dk1"/>
+                </a:solidFill>
+              </a:rPr>
+              <a:t>Using SciKit Learns RandomForestRegressor as another model to potentially get a better accuracy score.</a:t>
+            </a:r>
+          </a:p>
+          <a:p>
+            <a:pPr marL="127000" lvl="0" indent="0" algn="l" rtl="0">
+              <a:spcBef>
+                <a:spcPts val="1200"/>
+              </a:spcBef>
+              <a:spcAft>
+                <a:spcPts val="0"/>
+              </a:spcAft>
+              <a:buClr>
+                <a:schemeClr val="dk1"/>
+              </a:buClr>
+              <a:buSzPts val="1600"/>
+              <a:buNone/>
+            </a:pPr>
+            <a:endParaRPr sz="1400" dirty="0">
+              <a:solidFill>
+                <a:schemeClr val="dk1"/>
+              </a:solidFill>
+            </a:endParaRPr>
           </a:p>
         </p:txBody>
       </p:sp>
+      <p:pic>
+        <p:nvPicPr>
+          <p:cNvPr id="3" name="Picture 2">
+            <a:extLst>
+              <a:ext uri="{FF2B5EF4-FFF2-40B4-BE49-F238E27FC236}">
+                <a16:creationId xmlns:a16="http://schemas.microsoft.com/office/drawing/2014/main" id="{3341F8EF-A73A-4AEE-A823-6E513397B9DE}"/>
+              </a:ext>
+            </a:extLst>
+          </p:cNvPr>
+          <p:cNvPicPr>
+            <a:picLocks noChangeAspect="1"/>
+          </p:cNvPicPr>
+          <p:nvPr/>
+        </p:nvPicPr>
+        <p:blipFill>
+          <a:blip r:embed="rId3"/>
+          <a:stretch>
+            <a:fillRect/>
+          </a:stretch>
+        </p:blipFill>
+        <p:spPr>
+          <a:xfrm>
+            <a:off x="1984917" y="2571750"/>
+            <a:ext cx="5174166" cy="997430"/>
+          </a:xfrm>
+          <a:prstGeom prst="rect">
+            <a:avLst/>
+          </a:prstGeom>
+        </p:spPr>
+      </p:pic>
     </p:spTree>
+    <p:extLst>
+      <p:ext uri="{BB962C8B-B14F-4D97-AF65-F5344CB8AC3E}">
+        <p14:creationId xmlns:p14="http://schemas.microsoft.com/office/powerpoint/2010/main" val="1183709804"/>
+      </p:ext>
+    </p:extLst>
   </p:cSld>
   <p:clrMapOvr>
     <a:masterClrMapping/>

</xml_diff>